<commit_message>
#7 fixed the issue of all content being dumped on a single page
</commit_message>
<xml_diff>
--- a/src/output/eda_presentation.pptx
+++ b/src/output/eda_presentation.pptx
@@ -3118,20 +3118,37 @@
           <a:lstStyle/>
           <a:p>
             <a:r>
-              <a:t>Chart - univariate_smoker.png</a:t>
-            </a:r>
-          </a:p>
-        </p:txBody>
-      </p:sp>
-      <p:sp>
-        <p:nvSpPr>
-          <p:cNvPr id="3" name="TextBox 2"/>
+              <a:t>Statistical Analysis - univariate_analysis.txt</a:t>
+            </a:r>
+          </a:p>
+        </p:txBody>
+      </p:sp>
+      <p:sp>
+        <p:nvSpPr>
+          <p:cNvPr id="3" name="Content Placeholder 2"/>
+          <p:cNvSpPr>
+            <a:spLocks noGrp="1"/>
+          </p:cNvSpPr>
+          <p:nvPr>
+            <p:ph idx="1"/>
+          </p:nvPr>
+        </p:nvSpPr>
+        <p:spPr/>
+        <p:txBody>
+          <a:bodyPr/>
+          <a:lstStyle/>
+          <a:p/>
+        </p:txBody>
+      </p:sp>
+      <p:sp>
+        <p:nvSpPr>
+          <p:cNvPr id="4" name="TextBox 3"/>
           <p:cNvSpPr txBox="1"/>
           <p:nvPr/>
         </p:nvSpPr>
         <p:spPr>
           <a:xfrm>
-            <a:off x="914400" y="914400"/>
+            <a:off x="914400" y="1371600"/>
             <a:ext cx="7315200" cy="4572000"/>
           </a:xfrm>
           <a:prstGeom prst="rect">
@@ -3206,342 +3223,6 @@
           </a:p>
         </p:txBody>
       </p:sp>
-      <p:pic>
-        <p:nvPicPr>
-          <p:cNvPr id="4" name="Picture 3" descr="bivariate_age_vs_bmi.png"/>
-          <p:cNvPicPr>
-            <a:picLocks noChangeAspect="1"/>
-          </p:cNvPicPr>
-          <p:nvPr/>
-        </p:nvPicPr>
-        <p:blipFill>
-          <a:blip r:embed="rId2"/>
-          <a:stretch>
-            <a:fillRect/>
-          </a:stretch>
-        </p:blipFill>
-        <p:spPr>
-          <a:xfrm>
-            <a:off x="914400" y="914400"/>
-            <a:ext cx="7315200" cy="4572000"/>
-          </a:xfrm>
-          <a:prstGeom prst="rect">
-            <a:avLst/>
-          </a:prstGeom>
-        </p:spPr>
-      </p:pic>
-      <p:pic>
-        <p:nvPicPr>
-          <p:cNvPr id="5" name="Picture 4" descr="bivariate_age_vs_charges.png"/>
-          <p:cNvPicPr>
-            <a:picLocks noChangeAspect="1"/>
-          </p:cNvPicPr>
-          <p:nvPr/>
-        </p:nvPicPr>
-        <p:blipFill>
-          <a:blip r:embed="rId3"/>
-          <a:stretch>
-            <a:fillRect/>
-          </a:stretch>
-        </p:blipFill>
-        <p:spPr>
-          <a:xfrm>
-            <a:off x="914400" y="914400"/>
-            <a:ext cx="7315200" cy="4572000"/>
-          </a:xfrm>
-          <a:prstGeom prst="rect">
-            <a:avLst/>
-          </a:prstGeom>
-        </p:spPr>
-      </p:pic>
-      <p:pic>
-        <p:nvPicPr>
-          <p:cNvPr id="6" name="Picture 5" descr="bivariate_age_vs_children.png"/>
-          <p:cNvPicPr>
-            <a:picLocks noChangeAspect="1"/>
-          </p:cNvPicPr>
-          <p:nvPr/>
-        </p:nvPicPr>
-        <p:blipFill>
-          <a:blip r:embed="rId4"/>
-          <a:stretch>
-            <a:fillRect/>
-          </a:stretch>
-        </p:blipFill>
-        <p:spPr>
-          <a:xfrm>
-            <a:off x="914400" y="914400"/>
-            <a:ext cx="7315200" cy="4572000"/>
-          </a:xfrm>
-          <a:prstGeom prst="rect">
-            <a:avLst/>
-          </a:prstGeom>
-        </p:spPr>
-      </p:pic>
-      <p:pic>
-        <p:nvPicPr>
-          <p:cNvPr id="7" name="Picture 6" descr="bivariate_bmi_vs_charges.png"/>
-          <p:cNvPicPr>
-            <a:picLocks noChangeAspect="1"/>
-          </p:cNvPicPr>
-          <p:nvPr/>
-        </p:nvPicPr>
-        <p:blipFill>
-          <a:blip r:embed="rId5"/>
-          <a:stretch>
-            <a:fillRect/>
-          </a:stretch>
-        </p:blipFill>
-        <p:spPr>
-          <a:xfrm>
-            <a:off x="914400" y="914400"/>
-            <a:ext cx="7315200" cy="4572000"/>
-          </a:xfrm>
-          <a:prstGeom prst="rect">
-            <a:avLst/>
-          </a:prstGeom>
-        </p:spPr>
-      </p:pic>
-      <p:pic>
-        <p:nvPicPr>
-          <p:cNvPr id="8" name="Picture 7" descr="bivariate_bmi_vs_children.png"/>
-          <p:cNvPicPr>
-            <a:picLocks noChangeAspect="1"/>
-          </p:cNvPicPr>
-          <p:nvPr/>
-        </p:nvPicPr>
-        <p:blipFill>
-          <a:blip r:embed="rId6"/>
-          <a:stretch>
-            <a:fillRect/>
-          </a:stretch>
-        </p:blipFill>
-        <p:spPr>
-          <a:xfrm>
-            <a:off x="914400" y="914400"/>
-            <a:ext cx="7315200" cy="4572000"/>
-          </a:xfrm>
-          <a:prstGeom prst="rect">
-            <a:avLst/>
-          </a:prstGeom>
-        </p:spPr>
-      </p:pic>
-      <p:pic>
-        <p:nvPicPr>
-          <p:cNvPr id="9" name="Picture 8" descr="bivariate_children_vs_charges.png"/>
-          <p:cNvPicPr>
-            <a:picLocks noChangeAspect="1"/>
-          </p:cNvPicPr>
-          <p:nvPr/>
-        </p:nvPicPr>
-        <p:blipFill>
-          <a:blip r:embed="rId7"/>
-          <a:stretch>
-            <a:fillRect/>
-          </a:stretch>
-        </p:blipFill>
-        <p:spPr>
-          <a:xfrm>
-            <a:off x="914400" y="914400"/>
-            <a:ext cx="7315200" cy="4572000"/>
-          </a:xfrm>
-          <a:prstGeom prst="rect">
-            <a:avLst/>
-          </a:prstGeom>
-        </p:spPr>
-      </p:pic>
-      <p:pic>
-        <p:nvPicPr>
-          <p:cNvPr id="10" name="Picture 9" descr="correlation_matrix.png"/>
-          <p:cNvPicPr>
-            <a:picLocks noChangeAspect="1"/>
-          </p:cNvPicPr>
-          <p:nvPr/>
-        </p:nvPicPr>
-        <p:blipFill>
-          <a:blip r:embed="rId8"/>
-          <a:stretch>
-            <a:fillRect/>
-          </a:stretch>
-        </p:blipFill>
-        <p:spPr>
-          <a:xfrm>
-            <a:off x="914400" y="914400"/>
-            <a:ext cx="7315200" cy="4572000"/>
-          </a:xfrm>
-          <a:prstGeom prst="rect">
-            <a:avLst/>
-          </a:prstGeom>
-        </p:spPr>
-      </p:pic>
-      <p:pic>
-        <p:nvPicPr>
-          <p:cNvPr id="11" name="Picture 10" descr="univariate_age.png"/>
-          <p:cNvPicPr>
-            <a:picLocks noChangeAspect="1"/>
-          </p:cNvPicPr>
-          <p:nvPr/>
-        </p:nvPicPr>
-        <p:blipFill>
-          <a:blip r:embed="rId9"/>
-          <a:stretch>
-            <a:fillRect/>
-          </a:stretch>
-        </p:blipFill>
-        <p:spPr>
-          <a:xfrm>
-            <a:off x="914400" y="914400"/>
-            <a:ext cx="7315200" cy="4572000"/>
-          </a:xfrm>
-          <a:prstGeom prst="rect">
-            <a:avLst/>
-          </a:prstGeom>
-        </p:spPr>
-      </p:pic>
-      <p:pic>
-        <p:nvPicPr>
-          <p:cNvPr id="12" name="Picture 11" descr="univariate_bmi.png"/>
-          <p:cNvPicPr>
-            <a:picLocks noChangeAspect="1"/>
-          </p:cNvPicPr>
-          <p:nvPr/>
-        </p:nvPicPr>
-        <p:blipFill>
-          <a:blip r:embed="rId10"/>
-          <a:stretch>
-            <a:fillRect/>
-          </a:stretch>
-        </p:blipFill>
-        <p:spPr>
-          <a:xfrm>
-            <a:off x="914400" y="914400"/>
-            <a:ext cx="7315200" cy="4572000"/>
-          </a:xfrm>
-          <a:prstGeom prst="rect">
-            <a:avLst/>
-          </a:prstGeom>
-        </p:spPr>
-      </p:pic>
-      <p:pic>
-        <p:nvPicPr>
-          <p:cNvPr id="13" name="Picture 12" descr="univariate_charges.png"/>
-          <p:cNvPicPr>
-            <a:picLocks noChangeAspect="1"/>
-          </p:cNvPicPr>
-          <p:nvPr/>
-        </p:nvPicPr>
-        <p:blipFill>
-          <a:blip r:embed="rId11"/>
-          <a:stretch>
-            <a:fillRect/>
-          </a:stretch>
-        </p:blipFill>
-        <p:spPr>
-          <a:xfrm>
-            <a:off x="914400" y="914400"/>
-            <a:ext cx="7315200" cy="4572000"/>
-          </a:xfrm>
-          <a:prstGeom prst="rect">
-            <a:avLst/>
-          </a:prstGeom>
-        </p:spPr>
-      </p:pic>
-      <p:pic>
-        <p:nvPicPr>
-          <p:cNvPr id="14" name="Picture 13" descr="univariate_children.png"/>
-          <p:cNvPicPr>
-            <a:picLocks noChangeAspect="1"/>
-          </p:cNvPicPr>
-          <p:nvPr/>
-        </p:nvPicPr>
-        <p:blipFill>
-          <a:blip r:embed="rId12"/>
-          <a:stretch>
-            <a:fillRect/>
-          </a:stretch>
-        </p:blipFill>
-        <p:spPr>
-          <a:xfrm>
-            <a:off x="914400" y="914400"/>
-            <a:ext cx="7315200" cy="4572000"/>
-          </a:xfrm>
-          <a:prstGeom prst="rect">
-            <a:avLst/>
-          </a:prstGeom>
-        </p:spPr>
-      </p:pic>
-      <p:pic>
-        <p:nvPicPr>
-          <p:cNvPr id="15" name="Picture 14" descr="univariate_region.png"/>
-          <p:cNvPicPr>
-            <a:picLocks noChangeAspect="1"/>
-          </p:cNvPicPr>
-          <p:nvPr/>
-        </p:nvPicPr>
-        <p:blipFill>
-          <a:blip r:embed="rId13"/>
-          <a:stretch>
-            <a:fillRect/>
-          </a:stretch>
-        </p:blipFill>
-        <p:spPr>
-          <a:xfrm>
-            <a:off x="914400" y="914400"/>
-            <a:ext cx="7315200" cy="4572000"/>
-          </a:xfrm>
-          <a:prstGeom prst="rect">
-            <a:avLst/>
-          </a:prstGeom>
-        </p:spPr>
-      </p:pic>
-      <p:pic>
-        <p:nvPicPr>
-          <p:cNvPr id="16" name="Picture 15" descr="univariate_sex.png"/>
-          <p:cNvPicPr>
-            <a:picLocks noChangeAspect="1"/>
-          </p:cNvPicPr>
-          <p:nvPr/>
-        </p:nvPicPr>
-        <p:blipFill>
-          <a:blip r:embed="rId14"/>
-          <a:stretch>
-            <a:fillRect/>
-          </a:stretch>
-        </p:blipFill>
-        <p:spPr>
-          <a:xfrm>
-            <a:off x="914400" y="914400"/>
-            <a:ext cx="7315200" cy="4572000"/>
-          </a:xfrm>
-          <a:prstGeom prst="rect">
-            <a:avLst/>
-          </a:prstGeom>
-        </p:spPr>
-      </p:pic>
-      <p:pic>
-        <p:nvPicPr>
-          <p:cNvPr id="17" name="Picture 16" descr="univariate_smoker.png"/>
-          <p:cNvPicPr>
-            <a:picLocks noChangeAspect="1"/>
-          </p:cNvPicPr>
-          <p:nvPr/>
-        </p:nvPicPr>
-        <p:blipFill>
-          <a:blip r:embed="rId15"/>
-          <a:stretch>
-            <a:fillRect/>
-          </a:stretch>
-        </p:blipFill>
-        <p:spPr>
-          <a:xfrm>
-            <a:off x="914400" y="914400"/>
-            <a:ext cx="7315200" cy="4572000"/>
-          </a:xfrm>
-          <a:prstGeom prst="rect">
-            <a:avLst/>
-          </a:prstGeom>
-        </p:spPr>
-      </p:pic>
     </p:spTree>
   </p:cSld>
   <p:clrMapOvr>
@@ -3574,9 +3255,37 @@
         <p:txBody>
           <a:bodyPr/>
           <a:lstStyle/>
-          <a:p/>
-        </p:txBody>
-      </p:sp>
+          <a:p>
+            <a:r>
+              <a:t>Chart - univariate_bmi.png</a:t>
+            </a:r>
+          </a:p>
+        </p:txBody>
+      </p:sp>
+      <p:pic>
+        <p:nvPicPr>
+          <p:cNvPr id="3" name="Picture 2" descr="univariate_bmi.png"/>
+          <p:cNvPicPr>
+            <a:picLocks noChangeAspect="1"/>
+          </p:cNvPicPr>
+          <p:nvPr/>
+        </p:nvPicPr>
+        <p:blipFill>
+          <a:blip r:embed="rId2"/>
+          <a:stretch>
+            <a:fillRect/>
+          </a:stretch>
+        </p:blipFill>
+        <p:spPr>
+          <a:xfrm>
+            <a:off x="914400" y="1371600"/>
+            <a:ext cx="7315200" cy="4572000"/>
+          </a:xfrm>
+          <a:prstGeom prst="rect">
+            <a:avLst/>
+          </a:prstGeom>
+        </p:spPr>
+      </p:pic>
     </p:spTree>
   </p:cSld>
   <p:clrMapOvr>
@@ -3609,9 +3318,37 @@
         <p:txBody>
           <a:bodyPr/>
           <a:lstStyle/>
-          <a:p/>
-        </p:txBody>
-      </p:sp>
+          <a:p>
+            <a:r>
+              <a:t>Chart - univariate_charges.png</a:t>
+            </a:r>
+          </a:p>
+        </p:txBody>
+      </p:sp>
+      <p:pic>
+        <p:nvPicPr>
+          <p:cNvPr id="3" name="Picture 2" descr="univariate_charges.png"/>
+          <p:cNvPicPr>
+            <a:picLocks noChangeAspect="1"/>
+          </p:cNvPicPr>
+          <p:nvPr/>
+        </p:nvPicPr>
+        <p:blipFill>
+          <a:blip r:embed="rId2"/>
+          <a:stretch>
+            <a:fillRect/>
+          </a:stretch>
+        </p:blipFill>
+        <p:spPr>
+          <a:xfrm>
+            <a:off x="914400" y="1371600"/>
+            <a:ext cx="7315200" cy="4572000"/>
+          </a:xfrm>
+          <a:prstGeom prst="rect">
+            <a:avLst/>
+          </a:prstGeom>
+        </p:spPr>
+      </p:pic>
     </p:spTree>
   </p:cSld>
   <p:clrMapOvr>
@@ -3644,9 +3381,37 @@
         <p:txBody>
           <a:bodyPr/>
           <a:lstStyle/>
-          <a:p/>
-        </p:txBody>
-      </p:sp>
+          <a:p>
+            <a:r>
+              <a:t>Chart - univariate_children.png</a:t>
+            </a:r>
+          </a:p>
+        </p:txBody>
+      </p:sp>
+      <p:pic>
+        <p:nvPicPr>
+          <p:cNvPr id="3" name="Picture 2" descr="univariate_children.png"/>
+          <p:cNvPicPr>
+            <a:picLocks noChangeAspect="1"/>
+          </p:cNvPicPr>
+          <p:nvPr/>
+        </p:nvPicPr>
+        <p:blipFill>
+          <a:blip r:embed="rId2"/>
+          <a:stretch>
+            <a:fillRect/>
+          </a:stretch>
+        </p:blipFill>
+        <p:spPr>
+          <a:xfrm>
+            <a:off x="914400" y="1371600"/>
+            <a:ext cx="7315200" cy="4572000"/>
+          </a:xfrm>
+          <a:prstGeom prst="rect">
+            <a:avLst/>
+          </a:prstGeom>
+        </p:spPr>
+      </p:pic>
     </p:spTree>
   </p:cSld>
   <p:clrMapOvr>
@@ -3679,9 +3444,37 @@
         <p:txBody>
           <a:bodyPr/>
           <a:lstStyle/>
-          <a:p/>
-        </p:txBody>
-      </p:sp>
+          <a:p>
+            <a:r>
+              <a:t>Chart - univariate_region.png</a:t>
+            </a:r>
+          </a:p>
+        </p:txBody>
+      </p:sp>
+      <p:pic>
+        <p:nvPicPr>
+          <p:cNvPr id="3" name="Picture 2" descr="univariate_region.png"/>
+          <p:cNvPicPr>
+            <a:picLocks noChangeAspect="1"/>
+          </p:cNvPicPr>
+          <p:nvPr/>
+        </p:nvPicPr>
+        <p:blipFill>
+          <a:blip r:embed="rId2"/>
+          <a:stretch>
+            <a:fillRect/>
+          </a:stretch>
+        </p:blipFill>
+        <p:spPr>
+          <a:xfrm>
+            <a:off x="914400" y="1371600"/>
+            <a:ext cx="7315200" cy="4572000"/>
+          </a:xfrm>
+          <a:prstGeom prst="rect">
+            <a:avLst/>
+          </a:prstGeom>
+        </p:spPr>
+      </p:pic>
     </p:spTree>
   </p:cSld>
   <p:clrMapOvr>
@@ -3714,9 +3507,37 @@
         <p:txBody>
           <a:bodyPr/>
           <a:lstStyle/>
-          <a:p/>
-        </p:txBody>
-      </p:sp>
+          <a:p>
+            <a:r>
+              <a:t>Chart - univariate_sex.png</a:t>
+            </a:r>
+          </a:p>
+        </p:txBody>
+      </p:sp>
+      <p:pic>
+        <p:nvPicPr>
+          <p:cNvPr id="3" name="Picture 2" descr="univariate_sex.png"/>
+          <p:cNvPicPr>
+            <a:picLocks noChangeAspect="1"/>
+          </p:cNvPicPr>
+          <p:nvPr/>
+        </p:nvPicPr>
+        <p:blipFill>
+          <a:blip r:embed="rId2"/>
+          <a:stretch>
+            <a:fillRect/>
+          </a:stretch>
+        </p:blipFill>
+        <p:spPr>
+          <a:xfrm>
+            <a:off x="914400" y="1371600"/>
+            <a:ext cx="7315200" cy="4572000"/>
+          </a:xfrm>
+          <a:prstGeom prst="rect">
+            <a:avLst/>
+          </a:prstGeom>
+        </p:spPr>
+      </p:pic>
     </p:spTree>
   </p:cSld>
   <p:clrMapOvr>
@@ -3749,9 +3570,37 @@
         <p:txBody>
           <a:bodyPr/>
           <a:lstStyle/>
-          <a:p/>
-        </p:txBody>
-      </p:sp>
+          <a:p>
+            <a:r>
+              <a:t>Chart - univariate_smoker.png</a:t>
+            </a:r>
+          </a:p>
+        </p:txBody>
+      </p:sp>
+      <p:pic>
+        <p:nvPicPr>
+          <p:cNvPr id="3" name="Picture 2" descr="univariate_smoker.png"/>
+          <p:cNvPicPr>
+            <a:picLocks noChangeAspect="1"/>
+          </p:cNvPicPr>
+          <p:nvPr/>
+        </p:nvPicPr>
+        <p:blipFill>
+          <a:blip r:embed="rId2"/>
+          <a:stretch>
+            <a:fillRect/>
+          </a:stretch>
+        </p:blipFill>
+        <p:spPr>
+          <a:xfrm>
+            <a:off x="914400" y="1371600"/>
+            <a:ext cx="7315200" cy="4572000"/>
+          </a:xfrm>
+          <a:prstGeom prst="rect">
+            <a:avLst/>
+          </a:prstGeom>
+        </p:spPr>
+      </p:pic>
     </p:spTree>
   </p:cSld>
   <p:clrMapOvr>
@@ -3784,9 +3633,37 @@
         <p:txBody>
           <a:bodyPr/>
           <a:lstStyle/>
-          <a:p/>
-        </p:txBody>
-      </p:sp>
+          <a:p>
+            <a:r>
+              <a:t>Chart - bivariate_age_vs_bmi.png</a:t>
+            </a:r>
+          </a:p>
+        </p:txBody>
+      </p:sp>
+      <p:pic>
+        <p:nvPicPr>
+          <p:cNvPr id="3" name="Picture 2" descr="bivariate_age_vs_bmi.png"/>
+          <p:cNvPicPr>
+            <a:picLocks noChangeAspect="1"/>
+          </p:cNvPicPr>
+          <p:nvPr/>
+        </p:nvPicPr>
+        <p:blipFill>
+          <a:blip r:embed="rId2"/>
+          <a:stretch>
+            <a:fillRect/>
+          </a:stretch>
+        </p:blipFill>
+        <p:spPr>
+          <a:xfrm>
+            <a:off x="914400" y="1371600"/>
+            <a:ext cx="7315200" cy="4572000"/>
+          </a:xfrm>
+          <a:prstGeom prst="rect">
+            <a:avLst/>
+          </a:prstGeom>
+        </p:spPr>
+      </p:pic>
     </p:spTree>
   </p:cSld>
   <p:clrMapOvr>
@@ -3819,9 +3696,37 @@
         <p:txBody>
           <a:bodyPr/>
           <a:lstStyle/>
-          <a:p/>
-        </p:txBody>
-      </p:sp>
+          <a:p>
+            <a:r>
+              <a:t>Chart - bivariate_age_vs_charges.png</a:t>
+            </a:r>
+          </a:p>
+        </p:txBody>
+      </p:sp>
+      <p:pic>
+        <p:nvPicPr>
+          <p:cNvPr id="3" name="Picture 2" descr="bivariate_age_vs_charges.png"/>
+          <p:cNvPicPr>
+            <a:picLocks noChangeAspect="1"/>
+          </p:cNvPicPr>
+          <p:nvPr/>
+        </p:nvPicPr>
+        <p:blipFill>
+          <a:blip r:embed="rId2"/>
+          <a:stretch>
+            <a:fillRect/>
+          </a:stretch>
+        </p:blipFill>
+        <p:spPr>
+          <a:xfrm>
+            <a:off x="914400" y="1371600"/>
+            <a:ext cx="7315200" cy="4572000"/>
+          </a:xfrm>
+          <a:prstGeom prst="rect">
+            <a:avLst/>
+          </a:prstGeom>
+        </p:spPr>
+      </p:pic>
     </p:spTree>
   </p:cSld>
   <p:clrMapOvr>
@@ -3854,9 +3759,37 @@
         <p:txBody>
           <a:bodyPr/>
           <a:lstStyle/>
-          <a:p/>
-        </p:txBody>
-      </p:sp>
+          <a:p>
+            <a:r>
+              <a:t>Chart - bivariate_age_vs_children.png</a:t>
+            </a:r>
+          </a:p>
+        </p:txBody>
+      </p:sp>
+      <p:pic>
+        <p:nvPicPr>
+          <p:cNvPr id="3" name="Picture 2" descr="bivariate_age_vs_children.png"/>
+          <p:cNvPicPr>
+            <a:picLocks noChangeAspect="1"/>
+          </p:cNvPicPr>
+          <p:nvPr/>
+        </p:nvPicPr>
+        <p:blipFill>
+          <a:blip r:embed="rId2"/>
+          <a:stretch>
+            <a:fillRect/>
+          </a:stretch>
+        </p:blipFill>
+        <p:spPr>
+          <a:xfrm>
+            <a:off x="914400" y="1371600"/>
+            <a:ext cx="7315200" cy="4572000"/>
+          </a:xfrm>
+          <a:prstGeom prst="rect">
+            <a:avLst/>
+          </a:prstGeom>
+        </p:spPr>
+      </p:pic>
     </p:spTree>
   </p:cSld>
   <p:clrMapOvr>
@@ -3889,9 +3822,37 @@
         <p:txBody>
           <a:bodyPr/>
           <a:lstStyle/>
-          <a:p/>
-        </p:txBody>
-      </p:sp>
+          <a:p>
+            <a:r>
+              <a:t>Chart - bivariate_bmi_vs_charges.png</a:t>
+            </a:r>
+          </a:p>
+        </p:txBody>
+      </p:sp>
+      <p:pic>
+        <p:nvPicPr>
+          <p:cNvPr id="3" name="Picture 2" descr="bivariate_bmi_vs_charges.png"/>
+          <p:cNvPicPr>
+            <a:picLocks noChangeAspect="1"/>
+          </p:cNvPicPr>
+          <p:nvPr/>
+        </p:nvPicPr>
+        <p:blipFill>
+          <a:blip r:embed="rId2"/>
+          <a:stretch>
+            <a:fillRect/>
+          </a:stretch>
+        </p:blipFill>
+        <p:spPr>
+          <a:xfrm>
+            <a:off x="914400" y="1371600"/>
+            <a:ext cx="7315200" cy="4572000"/>
+          </a:xfrm>
+          <a:prstGeom prst="rect">
+            <a:avLst/>
+          </a:prstGeom>
+        </p:spPr>
+      </p:pic>
     </p:spTree>
   </p:cSld>
   <p:clrMapOvr>
@@ -3924,9 +3885,37 @@
         <p:txBody>
           <a:bodyPr/>
           <a:lstStyle/>
-          <a:p/>
-        </p:txBody>
-      </p:sp>
+          <a:p>
+            <a:r>
+              <a:t>Chart - bivariate_bmi_vs_children.png</a:t>
+            </a:r>
+          </a:p>
+        </p:txBody>
+      </p:sp>
+      <p:pic>
+        <p:nvPicPr>
+          <p:cNvPr id="3" name="Picture 2" descr="bivariate_bmi_vs_children.png"/>
+          <p:cNvPicPr>
+            <a:picLocks noChangeAspect="1"/>
+          </p:cNvPicPr>
+          <p:nvPr/>
+        </p:nvPicPr>
+        <p:blipFill>
+          <a:blip r:embed="rId2"/>
+          <a:stretch>
+            <a:fillRect/>
+          </a:stretch>
+        </p:blipFill>
+        <p:spPr>
+          <a:xfrm>
+            <a:off x="914400" y="1371600"/>
+            <a:ext cx="7315200" cy="4572000"/>
+          </a:xfrm>
+          <a:prstGeom prst="rect">
+            <a:avLst/>
+          </a:prstGeom>
+        </p:spPr>
+      </p:pic>
     </p:spTree>
   </p:cSld>
   <p:clrMapOvr>
@@ -3959,9 +3948,37 @@
         <p:txBody>
           <a:bodyPr/>
           <a:lstStyle/>
-          <a:p/>
-        </p:txBody>
-      </p:sp>
+          <a:p>
+            <a:r>
+              <a:t>Chart - bivariate_children_vs_charges.png</a:t>
+            </a:r>
+          </a:p>
+        </p:txBody>
+      </p:sp>
+      <p:pic>
+        <p:nvPicPr>
+          <p:cNvPr id="3" name="Picture 2" descr="bivariate_children_vs_charges.png"/>
+          <p:cNvPicPr>
+            <a:picLocks noChangeAspect="1"/>
+          </p:cNvPicPr>
+          <p:nvPr/>
+        </p:nvPicPr>
+        <p:blipFill>
+          <a:blip r:embed="rId2"/>
+          <a:stretch>
+            <a:fillRect/>
+          </a:stretch>
+        </p:blipFill>
+        <p:spPr>
+          <a:xfrm>
+            <a:off x="914400" y="1371600"/>
+            <a:ext cx="7315200" cy="4572000"/>
+          </a:xfrm>
+          <a:prstGeom prst="rect">
+            <a:avLst/>
+          </a:prstGeom>
+        </p:spPr>
+      </p:pic>
     </p:spTree>
   </p:cSld>
   <p:clrMapOvr>
@@ -3994,9 +4011,37 @@
         <p:txBody>
           <a:bodyPr/>
           <a:lstStyle/>
-          <a:p/>
-        </p:txBody>
-      </p:sp>
+          <a:p>
+            <a:r>
+              <a:t>Chart - correlation_matrix.png</a:t>
+            </a:r>
+          </a:p>
+        </p:txBody>
+      </p:sp>
+      <p:pic>
+        <p:nvPicPr>
+          <p:cNvPr id="3" name="Picture 2" descr="correlation_matrix.png"/>
+          <p:cNvPicPr>
+            <a:picLocks noChangeAspect="1"/>
+          </p:cNvPicPr>
+          <p:nvPr/>
+        </p:nvPicPr>
+        <p:blipFill>
+          <a:blip r:embed="rId2"/>
+          <a:stretch>
+            <a:fillRect/>
+          </a:stretch>
+        </p:blipFill>
+        <p:spPr>
+          <a:xfrm>
+            <a:off x="914400" y="1371600"/>
+            <a:ext cx="7315200" cy="4572000"/>
+          </a:xfrm>
+          <a:prstGeom prst="rect">
+            <a:avLst/>
+          </a:prstGeom>
+        </p:spPr>
+      </p:pic>
     </p:spTree>
   </p:cSld>
   <p:clrMapOvr>
@@ -4029,9 +4074,37 @@
         <p:txBody>
           <a:bodyPr/>
           <a:lstStyle/>
-          <a:p/>
-        </p:txBody>
-      </p:sp>
+          <a:p>
+            <a:r>
+              <a:t>Chart - univariate_age.png</a:t>
+            </a:r>
+          </a:p>
+        </p:txBody>
+      </p:sp>
+      <p:pic>
+        <p:nvPicPr>
+          <p:cNvPr id="3" name="Picture 2" descr="univariate_age.png"/>
+          <p:cNvPicPr>
+            <a:picLocks noChangeAspect="1"/>
+          </p:cNvPicPr>
+          <p:nvPr/>
+        </p:nvPicPr>
+        <p:blipFill>
+          <a:blip r:embed="rId2"/>
+          <a:stretch>
+            <a:fillRect/>
+          </a:stretch>
+        </p:blipFill>
+        <p:spPr>
+          <a:xfrm>
+            <a:off x="914400" y="1371600"/>
+            <a:ext cx="7315200" cy="4572000"/>
+          </a:xfrm>
+          <a:prstGeom prst="rect">
+            <a:avLst/>
+          </a:prstGeom>
+        </p:spPr>
+      </p:pic>
     </p:spTree>
   </p:cSld>
   <p:clrMapOvr>

</xml_diff>

<commit_message>
#7 added a title slide
</commit_message>
<xml_diff>
--- a/src/output/eda_presentation.pptx
+++ b/src/output/eda_presentation.pptx
@@ -20,6 +20,7 @@
     <p:sldId id="268" r:id="rId19"/>
     <p:sldId id="269" r:id="rId20"/>
     <p:sldId id="270" r:id="rId21"/>
+    <p:sldId id="271" r:id="rId22"/>
   </p:sldIdLst>
   <p:sldSz cx="9144000" cy="6858000" type="screen4x3"/>
   <p:notesSz cx="6858000" cy="9144000"/>
@@ -3109,116 +3110,37 @@
             <a:spLocks noGrp="1"/>
           </p:cNvSpPr>
           <p:nvPr>
-            <p:ph type="title"/>
-          </p:nvPr>
-        </p:nvSpPr>
-        <p:spPr/>
-        <p:txBody>
-          <a:bodyPr/>
-          <a:lstStyle/>
-          <a:p>
-            <a:r>
-              <a:t>Statistical Analysis - univariate_analysis.txt</a:t>
-            </a:r>
-          </a:p>
-        </p:txBody>
-      </p:sp>
-      <p:sp>
-        <p:nvSpPr>
-          <p:cNvPr id="3" name="Content Placeholder 2"/>
-          <p:cNvSpPr>
-            <a:spLocks noGrp="1"/>
-          </p:cNvSpPr>
-          <p:nvPr>
-            <p:ph idx="1"/>
-          </p:nvPr>
-        </p:nvSpPr>
-        <p:spPr/>
-        <p:txBody>
-          <a:bodyPr/>
-          <a:lstStyle/>
-          <a:p/>
-        </p:txBody>
-      </p:sp>
-      <p:sp>
-        <p:nvSpPr>
-          <p:cNvPr id="4" name="TextBox 3"/>
-          <p:cNvSpPr txBox="1"/>
-          <p:nvPr/>
-        </p:nvSpPr>
-        <p:spPr>
-          <a:xfrm>
-            <a:off x="914400" y="1371600"/>
-            <a:ext cx="7315200" cy="4572000"/>
-          </a:xfrm>
-          <a:prstGeom prst="rect">
-            <a:avLst/>
-          </a:prstGeom>
-          <a:noFill/>
-        </p:spPr>
-        <p:txBody>
-          <a:bodyPr wrap="none">
-            <a:spAutoFit/>
-          </a:bodyPr>
-          <a:lstStyle/>
-          <a:p>
-            <a:r>
-              <a:t>                age   sex          bmi     children smoker     region       charges</a:t>
-            </a:r>
-          </a:p>
-          <a:p>
-            <a:r>
-              <a:t>count   1338.000000  1338  1338.000000  1338.000000   1338       1338   1338.000000</a:t>
-            </a:r>
-          </a:p>
-          <a:p>
-            <a:r>
-              <a:t>unique          NaN     2          NaN          NaN      2          4           NaN</a:t>
-            </a:r>
-          </a:p>
-          <a:p>
-            <a:r>
-              <a:t>top             NaN  male          NaN          NaN     no  southeast           NaN</a:t>
-            </a:r>
-          </a:p>
-          <a:p>
-            <a:r>
-              <a:t>freq            NaN   676          NaN          NaN   1064        364           NaN</a:t>
-            </a:r>
-          </a:p>
-          <a:p>
-            <a:r>
-              <a:t>mean      39.207025   NaN    30.663397     1.094918    NaN        NaN  13270.422265</a:t>
-            </a:r>
-          </a:p>
-          <a:p>
-            <a:r>
-              <a:t>std       14.049960   NaN     6.098187     1.205493    NaN        NaN  12110.011237</a:t>
-            </a:r>
-          </a:p>
-          <a:p>
-            <a:r>
-              <a:t>min       18.000000   NaN    15.960000     0.000000    NaN        NaN   1121.873900</a:t>
-            </a:r>
-          </a:p>
-          <a:p>
-            <a:r>
-              <a:t>25%       27.000000   NaN    26.296250     0.000000    NaN        NaN   4740.287150</a:t>
-            </a:r>
-          </a:p>
-          <a:p>
-            <a:r>
-              <a:t>50%       39.000000   NaN    30.400000     1.000000    NaN        NaN   9382.033000</a:t>
-            </a:r>
-          </a:p>
-          <a:p>
-            <a:r>
-              <a:t>75%       51.000000   NaN    34.693750     2.000000    NaN        NaN  16639.912515</a:t>
-            </a:r>
-          </a:p>
-          <a:p>
-            <a:r>
-              <a:t>max       64.000000   NaN    53.130000     5.000000    NaN        NaN  63770.428010</a:t>
+            <p:ph type="ctrTitle"/>
+          </p:nvPr>
+        </p:nvSpPr>
+        <p:spPr/>
+        <p:txBody>
+          <a:bodyPr/>
+          <a:lstStyle/>
+          <a:p>
+            <a:r>
+              <a:t>Exploratory Data Analysis</a:t>
+            </a:r>
+          </a:p>
+        </p:txBody>
+      </p:sp>
+      <p:sp>
+        <p:nvSpPr>
+          <p:cNvPr id="3" name="Subtitle 2"/>
+          <p:cNvSpPr>
+            <a:spLocks noGrp="1"/>
+          </p:cNvSpPr>
+          <p:nvPr>
+            <p:ph type="subTitle" idx="1"/>
+          </p:nvPr>
+        </p:nvSpPr>
+        <p:spPr/>
+        <p:txBody>
+          <a:bodyPr/>
+          <a:lstStyle/>
+          <a:p>
+            <a:r>
+              <a:t>Insights from the Dataset</a:t>
             </a:r>
           </a:p>
         </p:txBody>
@@ -3257,14 +3179,14 @@
           <a:lstStyle/>
           <a:p>
             <a:r>
-              <a:t>Chart - univariate_bmi.png</a:t>
+              <a:t>Chart - univariate_age.png</a:t>
             </a:r>
           </a:p>
         </p:txBody>
       </p:sp>
       <p:pic>
         <p:nvPicPr>
-          <p:cNvPr id="3" name="Picture 2" descr="univariate_bmi.png"/>
+          <p:cNvPr id="3" name="Picture 2" descr="univariate_age.png"/>
           <p:cNvPicPr>
             <a:picLocks noChangeAspect="1"/>
           </p:cNvPicPr>
@@ -3320,14 +3242,14 @@
           <a:lstStyle/>
           <a:p>
             <a:r>
-              <a:t>Chart - univariate_charges.png</a:t>
+              <a:t>Chart - univariate_bmi.png</a:t>
             </a:r>
           </a:p>
         </p:txBody>
       </p:sp>
       <p:pic>
         <p:nvPicPr>
-          <p:cNvPr id="3" name="Picture 2" descr="univariate_charges.png"/>
+          <p:cNvPr id="3" name="Picture 2" descr="univariate_bmi.png"/>
           <p:cNvPicPr>
             <a:picLocks noChangeAspect="1"/>
           </p:cNvPicPr>
@@ -3383,14 +3305,14 @@
           <a:lstStyle/>
           <a:p>
             <a:r>
-              <a:t>Chart - univariate_children.png</a:t>
+              <a:t>Chart - univariate_charges.png</a:t>
             </a:r>
           </a:p>
         </p:txBody>
       </p:sp>
       <p:pic>
         <p:nvPicPr>
-          <p:cNvPr id="3" name="Picture 2" descr="univariate_children.png"/>
+          <p:cNvPr id="3" name="Picture 2" descr="univariate_charges.png"/>
           <p:cNvPicPr>
             <a:picLocks noChangeAspect="1"/>
           </p:cNvPicPr>
@@ -3446,14 +3368,14 @@
           <a:lstStyle/>
           <a:p>
             <a:r>
-              <a:t>Chart - univariate_region.png</a:t>
+              <a:t>Chart - univariate_children.png</a:t>
             </a:r>
           </a:p>
         </p:txBody>
       </p:sp>
       <p:pic>
         <p:nvPicPr>
-          <p:cNvPr id="3" name="Picture 2" descr="univariate_region.png"/>
+          <p:cNvPr id="3" name="Picture 2" descr="univariate_children.png"/>
           <p:cNvPicPr>
             <a:picLocks noChangeAspect="1"/>
           </p:cNvPicPr>
@@ -3509,6 +3431,69 @@
           <a:lstStyle/>
           <a:p>
             <a:r>
+              <a:t>Chart - univariate_region.png</a:t>
+            </a:r>
+          </a:p>
+        </p:txBody>
+      </p:sp>
+      <p:pic>
+        <p:nvPicPr>
+          <p:cNvPr id="3" name="Picture 2" descr="univariate_region.png"/>
+          <p:cNvPicPr>
+            <a:picLocks noChangeAspect="1"/>
+          </p:cNvPicPr>
+          <p:nvPr/>
+        </p:nvPicPr>
+        <p:blipFill>
+          <a:blip r:embed="rId2"/>
+          <a:stretch>
+            <a:fillRect/>
+          </a:stretch>
+        </p:blipFill>
+        <p:spPr>
+          <a:xfrm>
+            <a:off x="914400" y="1371600"/>
+            <a:ext cx="7315200" cy="4572000"/>
+          </a:xfrm>
+          <a:prstGeom prst="rect">
+            <a:avLst/>
+          </a:prstGeom>
+        </p:spPr>
+      </p:pic>
+    </p:spTree>
+  </p:cSld>
+  <p:clrMapOvr>
+    <a:masterClrMapping/>
+  </p:clrMapOvr>
+</p:sld>
+</file>
+
+<file path=ppt/slides/slide15.xml><?xml version="1.0" encoding="utf-8"?>
+<p:sld xmlns:a="http://schemas.openxmlformats.org/drawingml/2006/main" xmlns:p="http://schemas.openxmlformats.org/presentationml/2006/main" xmlns:r="http://schemas.openxmlformats.org/officeDocument/2006/relationships">
+  <p:cSld>
+    <p:spTree>
+      <p:nvGrpSpPr>
+        <p:cNvPr id="1" name=""/>
+        <p:cNvGrpSpPr/>
+        <p:nvPr/>
+      </p:nvGrpSpPr>
+      <p:grpSpPr/>
+      <p:sp>
+        <p:nvSpPr>
+          <p:cNvPr id="2" name="Title 1"/>
+          <p:cNvSpPr>
+            <a:spLocks noGrp="1"/>
+          </p:cNvSpPr>
+          <p:nvPr>
+            <p:ph type="title"/>
+          </p:nvPr>
+        </p:nvSpPr>
+        <p:spPr/>
+        <p:txBody>
+          <a:bodyPr/>
+          <a:lstStyle/>
+          <a:p>
+            <a:r>
               <a:t>Chart - univariate_sex.png</a:t>
             </a:r>
           </a:p>
@@ -3546,7 +3531,7 @@
 </p:sld>
 </file>
 
-<file path=ppt/slides/slide15.xml><?xml version="1.0" encoding="utf-8"?>
+<file path=ppt/slides/slide16.xml><?xml version="1.0" encoding="utf-8"?>
 <p:sld xmlns:a="http://schemas.openxmlformats.org/drawingml/2006/main" xmlns:p="http://schemas.openxmlformats.org/presentationml/2006/main" xmlns:r="http://schemas.openxmlformats.org/officeDocument/2006/relationships">
   <p:cSld>
     <p:spTree>
@@ -3635,25 +3620,34 @@
           <a:lstStyle/>
           <a:p>
             <a:r>
-              <a:t>Chart - bivariate_age_vs_bmi.png</a:t>
-            </a:r>
-          </a:p>
-        </p:txBody>
-      </p:sp>
-      <p:pic>
-        <p:nvPicPr>
-          <p:cNvPr id="3" name="Picture 2" descr="bivariate_age_vs_bmi.png"/>
-          <p:cNvPicPr>
-            <a:picLocks noChangeAspect="1"/>
-          </p:cNvPicPr>
+              <a:t>Statistical Analysis - univariate_analysis.txt</a:t>
+            </a:r>
+          </a:p>
+        </p:txBody>
+      </p:sp>
+      <p:sp>
+        <p:nvSpPr>
+          <p:cNvPr id="3" name="Content Placeholder 2"/>
+          <p:cNvSpPr>
+            <a:spLocks noGrp="1"/>
+          </p:cNvSpPr>
+          <p:nvPr>
+            <p:ph idx="1"/>
+          </p:nvPr>
+        </p:nvSpPr>
+        <p:spPr/>
+        <p:txBody>
+          <a:bodyPr/>
+          <a:lstStyle/>
+          <a:p/>
+        </p:txBody>
+      </p:sp>
+      <p:sp>
+        <p:nvSpPr>
+          <p:cNvPr id="4" name="TextBox 3"/>
+          <p:cNvSpPr txBox="1"/>
           <p:nvPr/>
-        </p:nvPicPr>
-        <p:blipFill>
-          <a:blip r:embed="rId2"/>
-          <a:stretch>
-            <a:fillRect/>
-          </a:stretch>
-        </p:blipFill>
+        </p:nvSpPr>
         <p:spPr>
           <a:xfrm>
             <a:off x="914400" y="1371600"/>
@@ -3662,8 +3656,75 @@
           <a:prstGeom prst="rect">
             <a:avLst/>
           </a:prstGeom>
+          <a:noFill/>
         </p:spPr>
-      </p:pic>
+        <p:txBody>
+          <a:bodyPr wrap="none">
+            <a:spAutoFit/>
+          </a:bodyPr>
+          <a:lstStyle/>
+          <a:p>
+            <a:r>
+              <a:t>                age   sex          bmi     children smoker     region       charges</a:t>
+            </a:r>
+          </a:p>
+          <a:p>
+            <a:r>
+              <a:t>count   1338.000000  1338  1338.000000  1338.000000   1338       1338   1338.000000</a:t>
+            </a:r>
+          </a:p>
+          <a:p>
+            <a:r>
+              <a:t>unique          NaN     2          NaN          NaN      2          4           NaN</a:t>
+            </a:r>
+          </a:p>
+          <a:p>
+            <a:r>
+              <a:t>top             NaN  male          NaN          NaN     no  southeast           NaN</a:t>
+            </a:r>
+          </a:p>
+          <a:p>
+            <a:r>
+              <a:t>freq            NaN   676          NaN          NaN   1064        364           NaN</a:t>
+            </a:r>
+          </a:p>
+          <a:p>
+            <a:r>
+              <a:t>mean      39.207025   NaN    30.663397     1.094918    NaN        NaN  13270.422265</a:t>
+            </a:r>
+          </a:p>
+          <a:p>
+            <a:r>
+              <a:t>std       14.049960   NaN     6.098187     1.205493    NaN        NaN  12110.011237</a:t>
+            </a:r>
+          </a:p>
+          <a:p>
+            <a:r>
+              <a:t>min       18.000000   NaN    15.960000     0.000000    NaN        NaN   1121.873900</a:t>
+            </a:r>
+          </a:p>
+          <a:p>
+            <a:r>
+              <a:t>25%       27.000000   NaN    26.296250     0.000000    NaN        NaN   4740.287150</a:t>
+            </a:r>
+          </a:p>
+          <a:p>
+            <a:r>
+              <a:t>50%       39.000000   NaN    30.400000     1.000000    NaN        NaN   9382.033000</a:t>
+            </a:r>
+          </a:p>
+          <a:p>
+            <a:r>
+              <a:t>75%       51.000000   NaN    34.693750     2.000000    NaN        NaN  16639.912515</a:t>
+            </a:r>
+          </a:p>
+          <a:p>
+            <a:r>
+              <a:t>max       64.000000   NaN    53.130000     5.000000    NaN        NaN  63770.428010</a:t>
+            </a:r>
+          </a:p>
+        </p:txBody>
+      </p:sp>
     </p:spTree>
   </p:cSld>
   <p:clrMapOvr>
@@ -3698,14 +3759,14 @@
           <a:lstStyle/>
           <a:p>
             <a:r>
-              <a:t>Chart - bivariate_age_vs_charges.png</a:t>
+              <a:t>Chart - bivariate_age_vs_bmi.png</a:t>
             </a:r>
           </a:p>
         </p:txBody>
       </p:sp>
       <p:pic>
         <p:nvPicPr>
-          <p:cNvPr id="3" name="Picture 2" descr="bivariate_age_vs_charges.png"/>
+          <p:cNvPr id="3" name="Picture 2" descr="bivariate_age_vs_bmi.png"/>
           <p:cNvPicPr>
             <a:picLocks noChangeAspect="1"/>
           </p:cNvPicPr>
@@ -3761,14 +3822,14 @@
           <a:lstStyle/>
           <a:p>
             <a:r>
-              <a:t>Chart - bivariate_age_vs_children.png</a:t>
+              <a:t>Chart - bivariate_age_vs_charges.png</a:t>
             </a:r>
           </a:p>
         </p:txBody>
       </p:sp>
       <p:pic>
         <p:nvPicPr>
-          <p:cNvPr id="3" name="Picture 2" descr="bivariate_age_vs_children.png"/>
+          <p:cNvPr id="3" name="Picture 2" descr="bivariate_age_vs_charges.png"/>
           <p:cNvPicPr>
             <a:picLocks noChangeAspect="1"/>
           </p:cNvPicPr>
@@ -3824,14 +3885,14 @@
           <a:lstStyle/>
           <a:p>
             <a:r>
-              <a:t>Chart - bivariate_bmi_vs_charges.png</a:t>
+              <a:t>Chart - bivariate_age_vs_children.png</a:t>
             </a:r>
           </a:p>
         </p:txBody>
       </p:sp>
       <p:pic>
         <p:nvPicPr>
-          <p:cNvPr id="3" name="Picture 2" descr="bivariate_bmi_vs_charges.png"/>
+          <p:cNvPr id="3" name="Picture 2" descr="bivariate_age_vs_children.png"/>
           <p:cNvPicPr>
             <a:picLocks noChangeAspect="1"/>
           </p:cNvPicPr>
@@ -3887,14 +3948,14 @@
           <a:lstStyle/>
           <a:p>
             <a:r>
-              <a:t>Chart - bivariate_bmi_vs_children.png</a:t>
+              <a:t>Chart - bivariate_bmi_vs_charges.png</a:t>
             </a:r>
           </a:p>
         </p:txBody>
       </p:sp>
       <p:pic>
         <p:nvPicPr>
-          <p:cNvPr id="3" name="Picture 2" descr="bivariate_bmi_vs_children.png"/>
+          <p:cNvPr id="3" name="Picture 2" descr="bivariate_bmi_vs_charges.png"/>
           <p:cNvPicPr>
             <a:picLocks noChangeAspect="1"/>
           </p:cNvPicPr>
@@ -3950,14 +4011,14 @@
           <a:lstStyle/>
           <a:p>
             <a:r>
-              <a:t>Chart - bivariate_children_vs_charges.png</a:t>
+              <a:t>Chart - bivariate_bmi_vs_children.png</a:t>
             </a:r>
           </a:p>
         </p:txBody>
       </p:sp>
       <p:pic>
         <p:nvPicPr>
-          <p:cNvPr id="3" name="Picture 2" descr="bivariate_children_vs_charges.png"/>
+          <p:cNvPr id="3" name="Picture 2" descr="bivariate_bmi_vs_children.png"/>
           <p:cNvPicPr>
             <a:picLocks noChangeAspect="1"/>
           </p:cNvPicPr>
@@ -4013,14 +4074,14 @@
           <a:lstStyle/>
           <a:p>
             <a:r>
-              <a:t>Chart - correlation_matrix.png</a:t>
+              <a:t>Chart - bivariate_children_vs_charges.png</a:t>
             </a:r>
           </a:p>
         </p:txBody>
       </p:sp>
       <p:pic>
         <p:nvPicPr>
-          <p:cNvPr id="3" name="Picture 2" descr="correlation_matrix.png"/>
+          <p:cNvPr id="3" name="Picture 2" descr="bivariate_children_vs_charges.png"/>
           <p:cNvPicPr>
             <a:picLocks noChangeAspect="1"/>
           </p:cNvPicPr>
@@ -4076,14 +4137,14 @@
           <a:lstStyle/>
           <a:p>
             <a:r>
-              <a:t>Chart - univariate_age.png</a:t>
+              <a:t>Chart - correlation_matrix.png</a:t>
             </a:r>
           </a:p>
         </p:txBody>
       </p:sp>
       <p:pic>
         <p:nvPicPr>
-          <p:cNvPr id="3" name="Picture 2" descr="univariate_age.png"/>
+          <p:cNvPr id="3" name="Picture 2" descr="correlation_matrix.png"/>
           <p:cNvPicPr>
             <a:picLocks noChangeAspect="1"/>
           </p:cNvPicPr>

</xml_diff>

<commit_message>
#7 fixed the slide dimension
</commit_message>
<xml_diff>
--- a/src/output/eda_presentation.pptx
+++ b/src/output/eda_presentation.pptx
@@ -22,7 +22,7 @@
     <p:sldId id="270" r:id="rId21"/>
     <p:sldId id="271" r:id="rId22"/>
   </p:sldIdLst>
-  <p:sldSz cx="9144000" cy="6858000" type="screen4x3"/>
+  <p:sldSz cx="12191969" cy="6858000" type="screen4x3"/>
   <p:notesSz cx="6858000" cy="9144000"/>
   <p:defaultTextStyle>
     <a:defPPr>
@@ -3201,7 +3201,7 @@
         <p:spPr>
           <a:xfrm>
             <a:off x="914400" y="1371600"/>
-            <a:ext cx="7315200" cy="4572000"/>
+            <a:ext cx="10058400" cy="4572000"/>
           </a:xfrm>
           <a:prstGeom prst="rect">
             <a:avLst/>
@@ -3264,7 +3264,7 @@
         <p:spPr>
           <a:xfrm>
             <a:off x="914400" y="1371600"/>
-            <a:ext cx="7315200" cy="4572000"/>
+            <a:ext cx="10058400" cy="4572000"/>
           </a:xfrm>
           <a:prstGeom prst="rect">
             <a:avLst/>
@@ -3327,7 +3327,7 @@
         <p:spPr>
           <a:xfrm>
             <a:off x="914400" y="1371600"/>
-            <a:ext cx="7315200" cy="4572000"/>
+            <a:ext cx="10058400" cy="4572000"/>
           </a:xfrm>
           <a:prstGeom prst="rect">
             <a:avLst/>
@@ -3390,7 +3390,7 @@
         <p:spPr>
           <a:xfrm>
             <a:off x="914400" y="1371600"/>
-            <a:ext cx="7315200" cy="4572000"/>
+            <a:ext cx="10058400" cy="4572000"/>
           </a:xfrm>
           <a:prstGeom prst="rect">
             <a:avLst/>
@@ -3453,7 +3453,7 @@
         <p:spPr>
           <a:xfrm>
             <a:off x="914400" y="1371600"/>
-            <a:ext cx="7315200" cy="4572000"/>
+            <a:ext cx="10058400" cy="4572000"/>
           </a:xfrm>
           <a:prstGeom prst="rect">
             <a:avLst/>
@@ -3516,7 +3516,7 @@
         <p:spPr>
           <a:xfrm>
             <a:off x="914400" y="1371600"/>
-            <a:ext cx="7315200" cy="4572000"/>
+            <a:ext cx="10058400" cy="4572000"/>
           </a:xfrm>
           <a:prstGeom prst="rect">
             <a:avLst/>
@@ -3579,7 +3579,7 @@
         <p:spPr>
           <a:xfrm>
             <a:off x="914400" y="1371600"/>
-            <a:ext cx="7315200" cy="4572000"/>
+            <a:ext cx="10058400" cy="4572000"/>
           </a:xfrm>
           <a:prstGeom prst="rect">
             <a:avLst/>
@@ -3651,7 +3651,7 @@
         <p:spPr>
           <a:xfrm>
             <a:off x="914400" y="1371600"/>
-            <a:ext cx="7315200" cy="4572000"/>
+            <a:ext cx="10058400" cy="4572000"/>
           </a:xfrm>
           <a:prstGeom prst="rect">
             <a:avLst/>
@@ -3781,7 +3781,7 @@
         <p:spPr>
           <a:xfrm>
             <a:off x="914400" y="1371600"/>
-            <a:ext cx="7315200" cy="4572000"/>
+            <a:ext cx="10058400" cy="4572000"/>
           </a:xfrm>
           <a:prstGeom prst="rect">
             <a:avLst/>
@@ -3844,7 +3844,7 @@
         <p:spPr>
           <a:xfrm>
             <a:off x="914400" y="1371600"/>
-            <a:ext cx="7315200" cy="4572000"/>
+            <a:ext cx="10058400" cy="4572000"/>
           </a:xfrm>
           <a:prstGeom prst="rect">
             <a:avLst/>
@@ -3907,7 +3907,7 @@
         <p:spPr>
           <a:xfrm>
             <a:off x="914400" y="1371600"/>
-            <a:ext cx="7315200" cy="4572000"/>
+            <a:ext cx="10058400" cy="4572000"/>
           </a:xfrm>
           <a:prstGeom prst="rect">
             <a:avLst/>
@@ -3970,7 +3970,7 @@
         <p:spPr>
           <a:xfrm>
             <a:off x="914400" y="1371600"/>
-            <a:ext cx="7315200" cy="4572000"/>
+            <a:ext cx="10058400" cy="4572000"/>
           </a:xfrm>
           <a:prstGeom prst="rect">
             <a:avLst/>
@@ -4033,7 +4033,7 @@
         <p:spPr>
           <a:xfrm>
             <a:off x="914400" y="1371600"/>
-            <a:ext cx="7315200" cy="4572000"/>
+            <a:ext cx="10058400" cy="4572000"/>
           </a:xfrm>
           <a:prstGeom prst="rect">
             <a:avLst/>
@@ -4096,7 +4096,7 @@
         <p:spPr>
           <a:xfrm>
             <a:off x="914400" y="1371600"/>
-            <a:ext cx="7315200" cy="4572000"/>
+            <a:ext cx="10058400" cy="4572000"/>
           </a:xfrm>
           <a:prstGeom prst="rect">
             <a:avLst/>
@@ -4159,7 +4159,7 @@
         <p:spPr>
           <a:xfrm>
             <a:off x="914400" y="1371600"/>
-            <a:ext cx="7315200" cy="4572000"/>
+            <a:ext cx="10058400" cy="4572000"/>
           </a:xfrm>
           <a:prstGeom prst="rect">
             <a:avLst/>

</xml_diff>

<commit_message>
#7 reduced the size of the charts present in the slides as they were overflowing
</commit_message>
<xml_diff>
--- a/src/output/eda_presentation.pptx
+++ b/src/output/eda_presentation.pptx
@@ -3201,7 +3201,7 @@
         <p:spPr>
           <a:xfrm>
             <a:off x="914400" y="1371600"/>
-            <a:ext cx="10058400" cy="4572000"/>
+            <a:ext cx="8229600" cy="4937760"/>
           </a:xfrm>
           <a:prstGeom prst="rect">
             <a:avLst/>
@@ -3264,7 +3264,7 @@
         <p:spPr>
           <a:xfrm>
             <a:off x="914400" y="1371600"/>
-            <a:ext cx="10058400" cy="4572000"/>
+            <a:ext cx="8229600" cy="4937760"/>
           </a:xfrm>
           <a:prstGeom prst="rect">
             <a:avLst/>
@@ -3327,7 +3327,7 @@
         <p:spPr>
           <a:xfrm>
             <a:off x="914400" y="1371600"/>
-            <a:ext cx="10058400" cy="4572000"/>
+            <a:ext cx="8229600" cy="4937760"/>
           </a:xfrm>
           <a:prstGeom prst="rect">
             <a:avLst/>
@@ -3390,7 +3390,7 @@
         <p:spPr>
           <a:xfrm>
             <a:off x="914400" y="1371600"/>
-            <a:ext cx="10058400" cy="4572000"/>
+            <a:ext cx="8229600" cy="4937760"/>
           </a:xfrm>
           <a:prstGeom prst="rect">
             <a:avLst/>
@@ -3453,7 +3453,7 @@
         <p:spPr>
           <a:xfrm>
             <a:off x="914400" y="1371600"/>
-            <a:ext cx="10058400" cy="4572000"/>
+            <a:ext cx="8229600" cy="4937760"/>
           </a:xfrm>
           <a:prstGeom prst="rect">
             <a:avLst/>
@@ -3516,7 +3516,7 @@
         <p:spPr>
           <a:xfrm>
             <a:off x="914400" y="1371600"/>
-            <a:ext cx="10058400" cy="4572000"/>
+            <a:ext cx="8229600" cy="4937760"/>
           </a:xfrm>
           <a:prstGeom prst="rect">
             <a:avLst/>
@@ -3579,7 +3579,7 @@
         <p:spPr>
           <a:xfrm>
             <a:off x="914400" y="1371600"/>
-            <a:ext cx="10058400" cy="4572000"/>
+            <a:ext cx="8229600" cy="4937760"/>
           </a:xfrm>
           <a:prstGeom prst="rect">
             <a:avLst/>
@@ -3651,7 +3651,7 @@
         <p:spPr>
           <a:xfrm>
             <a:off x="914400" y="1371600"/>
-            <a:ext cx="10058400" cy="4572000"/>
+            <a:ext cx="10058400" cy="3657600"/>
           </a:xfrm>
           <a:prstGeom prst="rect">
             <a:avLst/>
@@ -3664,61 +3664,97 @@
           </a:bodyPr>
           <a:lstStyle/>
           <a:p>
+            <a:pPr>
+              <a:defRPr sz="1728"/>
+            </a:pPr>
             <a:r>
               <a:t>                age   sex          bmi     children smoker     region       charges</a:t>
             </a:r>
           </a:p>
           <a:p>
+            <a:pPr>
+              <a:defRPr sz="1728"/>
+            </a:pPr>
             <a:r>
               <a:t>count   1338.000000  1338  1338.000000  1338.000000   1338       1338   1338.000000</a:t>
             </a:r>
           </a:p>
           <a:p>
+            <a:pPr>
+              <a:defRPr sz="1728"/>
+            </a:pPr>
             <a:r>
               <a:t>unique          NaN     2          NaN          NaN      2          4           NaN</a:t>
             </a:r>
           </a:p>
           <a:p>
+            <a:pPr>
+              <a:defRPr sz="1728"/>
+            </a:pPr>
             <a:r>
               <a:t>top             NaN  male          NaN          NaN     no  southeast           NaN</a:t>
             </a:r>
           </a:p>
           <a:p>
+            <a:pPr>
+              <a:defRPr sz="1728"/>
+            </a:pPr>
             <a:r>
               <a:t>freq            NaN   676          NaN          NaN   1064        364           NaN</a:t>
             </a:r>
           </a:p>
           <a:p>
+            <a:pPr>
+              <a:defRPr sz="1728"/>
+            </a:pPr>
             <a:r>
               <a:t>mean      39.207025   NaN    30.663397     1.094918    NaN        NaN  13270.422265</a:t>
             </a:r>
           </a:p>
           <a:p>
+            <a:pPr>
+              <a:defRPr sz="1728"/>
+            </a:pPr>
             <a:r>
               <a:t>std       14.049960   NaN     6.098187     1.205493    NaN        NaN  12110.011237</a:t>
             </a:r>
           </a:p>
           <a:p>
+            <a:pPr>
+              <a:defRPr sz="1728"/>
+            </a:pPr>
             <a:r>
               <a:t>min       18.000000   NaN    15.960000     0.000000    NaN        NaN   1121.873900</a:t>
             </a:r>
           </a:p>
           <a:p>
+            <a:pPr>
+              <a:defRPr sz="1728"/>
+            </a:pPr>
             <a:r>
               <a:t>25%       27.000000   NaN    26.296250     0.000000    NaN        NaN   4740.287150</a:t>
             </a:r>
           </a:p>
           <a:p>
+            <a:pPr>
+              <a:defRPr sz="1728"/>
+            </a:pPr>
             <a:r>
               <a:t>50%       39.000000   NaN    30.400000     1.000000    NaN        NaN   9382.033000</a:t>
             </a:r>
           </a:p>
           <a:p>
+            <a:pPr>
+              <a:defRPr sz="1728"/>
+            </a:pPr>
             <a:r>
               <a:t>75%       51.000000   NaN    34.693750     2.000000    NaN        NaN  16639.912515</a:t>
             </a:r>
           </a:p>
           <a:p>
+            <a:pPr>
+              <a:defRPr sz="1728"/>
+            </a:pPr>
             <a:r>
               <a:t>max       64.000000   NaN    53.130000     5.000000    NaN        NaN  63770.428010</a:t>
             </a:r>
@@ -3781,7 +3817,7 @@
         <p:spPr>
           <a:xfrm>
             <a:off x="914400" y="1371600"/>
-            <a:ext cx="10058400" cy="4572000"/>
+            <a:ext cx="8229600" cy="4937760"/>
           </a:xfrm>
           <a:prstGeom prst="rect">
             <a:avLst/>
@@ -3844,7 +3880,7 @@
         <p:spPr>
           <a:xfrm>
             <a:off x="914400" y="1371600"/>
-            <a:ext cx="10058400" cy="4572000"/>
+            <a:ext cx="8229600" cy="4937760"/>
           </a:xfrm>
           <a:prstGeom prst="rect">
             <a:avLst/>
@@ -3907,7 +3943,7 @@
         <p:spPr>
           <a:xfrm>
             <a:off x="914400" y="1371600"/>
-            <a:ext cx="10058400" cy="4572000"/>
+            <a:ext cx="8229600" cy="4937760"/>
           </a:xfrm>
           <a:prstGeom prst="rect">
             <a:avLst/>
@@ -3970,7 +4006,7 @@
         <p:spPr>
           <a:xfrm>
             <a:off x="914400" y="1371600"/>
-            <a:ext cx="10058400" cy="4572000"/>
+            <a:ext cx="8229600" cy="4937760"/>
           </a:xfrm>
           <a:prstGeom prst="rect">
             <a:avLst/>
@@ -4033,7 +4069,7 @@
         <p:spPr>
           <a:xfrm>
             <a:off x="914400" y="1371600"/>
-            <a:ext cx="10058400" cy="4572000"/>
+            <a:ext cx="8229600" cy="4937760"/>
           </a:xfrm>
           <a:prstGeom prst="rect">
             <a:avLst/>
@@ -4096,7 +4132,7 @@
         <p:spPr>
           <a:xfrm>
             <a:off x="914400" y="1371600"/>
-            <a:ext cx="10058400" cy="4572000"/>
+            <a:ext cx="8229600" cy="4937760"/>
           </a:xfrm>
           <a:prstGeom prst="rect">
             <a:avLst/>
@@ -4159,7 +4195,7 @@
         <p:spPr>
           <a:xfrm>
             <a:off x="914400" y="1371600"/>
-            <a:ext cx="10058400" cy="4572000"/>
+            <a:ext cx="8229600" cy="5486400"/>
           </a:xfrm>
           <a:prstGeom prst="rect">
             <a:avLst/>

</xml_diff>

<commit_message>
#7 removed the statistical summary section and created the function for table generatio n (now obsolete)
</commit_message>
<xml_diff>
--- a/src/output/eda_presentation.pptx
+++ b/src/output/eda_presentation.pptx
@@ -20,7 +20,6 @@
     <p:sldId id="268" r:id="rId19"/>
     <p:sldId id="269" r:id="rId20"/>
     <p:sldId id="270" r:id="rId21"/>
-    <p:sldId id="271" r:id="rId22"/>
   </p:sldIdLst>
   <p:sldSz cx="12191969" cy="6858000" type="screen4x3"/>
   <p:notesSz cx="6858000" cy="9144000"/>
@@ -3179,14 +3178,14 @@
           <a:lstStyle/>
           <a:p>
             <a:r>
-              <a:t>Chart - univariate_age.png</a:t>
+              <a:t>Chart - univariate_bmi.png</a:t>
             </a:r>
           </a:p>
         </p:txBody>
       </p:sp>
       <p:pic>
         <p:nvPicPr>
-          <p:cNvPr id="3" name="Picture 2" descr="univariate_age.png"/>
+          <p:cNvPr id="3" name="Picture 2" descr="univariate_bmi.png"/>
           <p:cNvPicPr>
             <a:picLocks noChangeAspect="1"/>
           </p:cNvPicPr>
@@ -3242,14 +3241,14 @@
           <a:lstStyle/>
           <a:p>
             <a:r>
-              <a:t>Chart - univariate_bmi.png</a:t>
+              <a:t>Chart - univariate_charges.png</a:t>
             </a:r>
           </a:p>
         </p:txBody>
       </p:sp>
       <p:pic>
         <p:nvPicPr>
-          <p:cNvPr id="3" name="Picture 2" descr="univariate_bmi.png"/>
+          <p:cNvPr id="3" name="Picture 2" descr="univariate_charges.png"/>
           <p:cNvPicPr>
             <a:picLocks noChangeAspect="1"/>
           </p:cNvPicPr>
@@ -3305,14 +3304,14 @@
           <a:lstStyle/>
           <a:p>
             <a:r>
-              <a:t>Chart - univariate_charges.png</a:t>
+              <a:t>Chart - univariate_children.png</a:t>
             </a:r>
           </a:p>
         </p:txBody>
       </p:sp>
       <p:pic>
         <p:nvPicPr>
-          <p:cNvPr id="3" name="Picture 2" descr="univariate_charges.png"/>
+          <p:cNvPr id="3" name="Picture 2" descr="univariate_children.png"/>
           <p:cNvPicPr>
             <a:picLocks noChangeAspect="1"/>
           </p:cNvPicPr>
@@ -3368,14 +3367,14 @@
           <a:lstStyle/>
           <a:p>
             <a:r>
-              <a:t>Chart - univariate_children.png</a:t>
+              <a:t>Chart - univariate_region.png</a:t>
             </a:r>
           </a:p>
         </p:txBody>
       </p:sp>
       <p:pic>
         <p:nvPicPr>
-          <p:cNvPr id="3" name="Picture 2" descr="univariate_children.png"/>
+          <p:cNvPr id="3" name="Picture 2" descr="univariate_region.png"/>
           <p:cNvPicPr>
             <a:picLocks noChangeAspect="1"/>
           </p:cNvPicPr>
@@ -3431,69 +3430,6 @@
           <a:lstStyle/>
           <a:p>
             <a:r>
-              <a:t>Chart - univariate_region.png</a:t>
-            </a:r>
-          </a:p>
-        </p:txBody>
-      </p:sp>
-      <p:pic>
-        <p:nvPicPr>
-          <p:cNvPr id="3" name="Picture 2" descr="univariate_region.png"/>
-          <p:cNvPicPr>
-            <a:picLocks noChangeAspect="1"/>
-          </p:cNvPicPr>
-          <p:nvPr/>
-        </p:nvPicPr>
-        <p:blipFill>
-          <a:blip r:embed="rId2"/>
-          <a:stretch>
-            <a:fillRect/>
-          </a:stretch>
-        </p:blipFill>
-        <p:spPr>
-          <a:xfrm>
-            <a:off x="914400" y="1371600"/>
-            <a:ext cx="8229600" cy="4937760"/>
-          </a:xfrm>
-          <a:prstGeom prst="rect">
-            <a:avLst/>
-          </a:prstGeom>
-        </p:spPr>
-      </p:pic>
-    </p:spTree>
-  </p:cSld>
-  <p:clrMapOvr>
-    <a:masterClrMapping/>
-  </p:clrMapOvr>
-</p:sld>
-</file>
-
-<file path=ppt/slides/slide15.xml><?xml version="1.0" encoding="utf-8"?>
-<p:sld xmlns:a="http://schemas.openxmlformats.org/drawingml/2006/main" xmlns:p="http://schemas.openxmlformats.org/presentationml/2006/main" xmlns:r="http://schemas.openxmlformats.org/officeDocument/2006/relationships">
-  <p:cSld>
-    <p:spTree>
-      <p:nvGrpSpPr>
-        <p:cNvPr id="1" name=""/>
-        <p:cNvGrpSpPr/>
-        <p:nvPr/>
-      </p:nvGrpSpPr>
-      <p:grpSpPr/>
-      <p:sp>
-        <p:nvSpPr>
-          <p:cNvPr id="2" name="Title 1"/>
-          <p:cNvSpPr>
-            <a:spLocks noGrp="1"/>
-          </p:cNvSpPr>
-          <p:nvPr>
-            <p:ph type="title"/>
-          </p:nvPr>
-        </p:nvSpPr>
-        <p:spPr/>
-        <p:txBody>
-          <a:bodyPr/>
-          <a:lstStyle/>
-          <a:p>
-            <a:r>
               <a:t>Chart - univariate_sex.png</a:t>
             </a:r>
           </a:p>
@@ -3531,7 +3467,7 @@
 </p:sld>
 </file>
 
-<file path=ppt/slides/slide16.xml><?xml version="1.0" encoding="utf-8"?>
+<file path=ppt/slides/slide15.xml><?xml version="1.0" encoding="utf-8"?>
 <p:sld xmlns:a="http://schemas.openxmlformats.org/drawingml/2006/main" xmlns:p="http://schemas.openxmlformats.org/presentationml/2006/main" xmlns:r="http://schemas.openxmlformats.org/officeDocument/2006/relationships">
   <p:cSld>
     <p:spTree>
@@ -3620,147 +3556,35 @@
           <a:lstStyle/>
           <a:p>
             <a:r>
-              <a:t>Statistical Analysis - univariate_analysis.txt</a:t>
-            </a:r>
-          </a:p>
-        </p:txBody>
-      </p:sp>
-      <p:sp>
-        <p:nvSpPr>
-          <p:cNvPr id="3" name="Content Placeholder 2"/>
-          <p:cNvSpPr>
-            <a:spLocks noGrp="1"/>
-          </p:cNvSpPr>
-          <p:nvPr>
-            <p:ph idx="1"/>
-          </p:nvPr>
-        </p:nvSpPr>
-        <p:spPr/>
-        <p:txBody>
-          <a:bodyPr/>
-          <a:lstStyle/>
-          <a:p/>
-        </p:txBody>
-      </p:sp>
-      <p:sp>
-        <p:nvSpPr>
-          <p:cNvPr id="4" name="TextBox 3"/>
-          <p:cNvSpPr txBox="1"/>
+              <a:t>Chart - bivariate_age_vs_bmi.png</a:t>
+            </a:r>
+          </a:p>
+        </p:txBody>
+      </p:sp>
+      <p:pic>
+        <p:nvPicPr>
+          <p:cNvPr id="3" name="Picture 2" descr="bivariate_age_vs_bmi.png"/>
+          <p:cNvPicPr>
+            <a:picLocks noChangeAspect="1"/>
+          </p:cNvPicPr>
           <p:nvPr/>
-        </p:nvSpPr>
+        </p:nvPicPr>
+        <p:blipFill>
+          <a:blip r:embed="rId2"/>
+          <a:stretch>
+            <a:fillRect/>
+          </a:stretch>
+        </p:blipFill>
         <p:spPr>
           <a:xfrm>
             <a:off x="914400" y="1371600"/>
-            <a:ext cx="10058400" cy="3657600"/>
+            <a:ext cx="8229600" cy="4937760"/>
           </a:xfrm>
           <a:prstGeom prst="rect">
             <a:avLst/>
           </a:prstGeom>
-          <a:noFill/>
         </p:spPr>
-        <p:txBody>
-          <a:bodyPr wrap="none">
-            <a:spAutoFit/>
-          </a:bodyPr>
-          <a:lstStyle/>
-          <a:p>
-            <a:pPr>
-              <a:defRPr sz="1728"/>
-            </a:pPr>
-            <a:r>
-              <a:t>                age   sex          bmi     children smoker     region       charges</a:t>
-            </a:r>
-          </a:p>
-          <a:p>
-            <a:pPr>
-              <a:defRPr sz="1728"/>
-            </a:pPr>
-            <a:r>
-              <a:t>count   1338.000000  1338  1338.000000  1338.000000   1338       1338   1338.000000</a:t>
-            </a:r>
-          </a:p>
-          <a:p>
-            <a:pPr>
-              <a:defRPr sz="1728"/>
-            </a:pPr>
-            <a:r>
-              <a:t>unique          NaN     2          NaN          NaN      2          4           NaN</a:t>
-            </a:r>
-          </a:p>
-          <a:p>
-            <a:pPr>
-              <a:defRPr sz="1728"/>
-            </a:pPr>
-            <a:r>
-              <a:t>top             NaN  male          NaN          NaN     no  southeast           NaN</a:t>
-            </a:r>
-          </a:p>
-          <a:p>
-            <a:pPr>
-              <a:defRPr sz="1728"/>
-            </a:pPr>
-            <a:r>
-              <a:t>freq            NaN   676          NaN          NaN   1064        364           NaN</a:t>
-            </a:r>
-          </a:p>
-          <a:p>
-            <a:pPr>
-              <a:defRPr sz="1728"/>
-            </a:pPr>
-            <a:r>
-              <a:t>mean      39.207025   NaN    30.663397     1.094918    NaN        NaN  13270.422265</a:t>
-            </a:r>
-          </a:p>
-          <a:p>
-            <a:pPr>
-              <a:defRPr sz="1728"/>
-            </a:pPr>
-            <a:r>
-              <a:t>std       14.049960   NaN     6.098187     1.205493    NaN        NaN  12110.011237</a:t>
-            </a:r>
-          </a:p>
-          <a:p>
-            <a:pPr>
-              <a:defRPr sz="1728"/>
-            </a:pPr>
-            <a:r>
-              <a:t>min       18.000000   NaN    15.960000     0.000000    NaN        NaN   1121.873900</a:t>
-            </a:r>
-          </a:p>
-          <a:p>
-            <a:pPr>
-              <a:defRPr sz="1728"/>
-            </a:pPr>
-            <a:r>
-              <a:t>25%       27.000000   NaN    26.296250     0.000000    NaN        NaN   4740.287150</a:t>
-            </a:r>
-          </a:p>
-          <a:p>
-            <a:pPr>
-              <a:defRPr sz="1728"/>
-            </a:pPr>
-            <a:r>
-              <a:t>50%       39.000000   NaN    30.400000     1.000000    NaN        NaN   9382.033000</a:t>
-            </a:r>
-          </a:p>
-          <a:p>
-            <a:pPr>
-              <a:defRPr sz="1728"/>
-            </a:pPr>
-            <a:r>
-              <a:t>75%       51.000000   NaN    34.693750     2.000000    NaN        NaN  16639.912515</a:t>
-            </a:r>
-          </a:p>
-          <a:p>
-            <a:pPr>
-              <a:defRPr sz="1728"/>
-            </a:pPr>
-            <a:r>
-              <a:t>max       64.000000   NaN    53.130000     5.000000    NaN        NaN  63770.428010</a:t>
-            </a:r>
-          </a:p>
-        </p:txBody>
-      </p:sp>
+      </p:pic>
     </p:spTree>
   </p:cSld>
   <p:clrMapOvr>
@@ -3795,14 +3619,14 @@
           <a:lstStyle/>
           <a:p>
             <a:r>
-              <a:t>Chart - bivariate_age_vs_bmi.png</a:t>
+              <a:t>Chart - bivariate_age_vs_charges.png</a:t>
             </a:r>
           </a:p>
         </p:txBody>
       </p:sp>
       <p:pic>
         <p:nvPicPr>
-          <p:cNvPr id="3" name="Picture 2" descr="bivariate_age_vs_bmi.png"/>
+          <p:cNvPr id="3" name="Picture 2" descr="bivariate_age_vs_charges.png"/>
           <p:cNvPicPr>
             <a:picLocks noChangeAspect="1"/>
           </p:cNvPicPr>
@@ -3858,14 +3682,14 @@
           <a:lstStyle/>
           <a:p>
             <a:r>
-              <a:t>Chart - bivariate_age_vs_charges.png</a:t>
+              <a:t>Chart - bivariate_age_vs_children.png</a:t>
             </a:r>
           </a:p>
         </p:txBody>
       </p:sp>
       <p:pic>
         <p:nvPicPr>
-          <p:cNvPr id="3" name="Picture 2" descr="bivariate_age_vs_charges.png"/>
+          <p:cNvPr id="3" name="Picture 2" descr="bivariate_age_vs_children.png"/>
           <p:cNvPicPr>
             <a:picLocks noChangeAspect="1"/>
           </p:cNvPicPr>
@@ -3921,14 +3745,14 @@
           <a:lstStyle/>
           <a:p>
             <a:r>
-              <a:t>Chart - bivariate_age_vs_children.png</a:t>
+              <a:t>Chart - bivariate_bmi_vs_charges.png</a:t>
             </a:r>
           </a:p>
         </p:txBody>
       </p:sp>
       <p:pic>
         <p:nvPicPr>
-          <p:cNvPr id="3" name="Picture 2" descr="bivariate_age_vs_children.png"/>
+          <p:cNvPr id="3" name="Picture 2" descr="bivariate_bmi_vs_charges.png"/>
           <p:cNvPicPr>
             <a:picLocks noChangeAspect="1"/>
           </p:cNvPicPr>
@@ -3984,14 +3808,14 @@
           <a:lstStyle/>
           <a:p>
             <a:r>
-              <a:t>Chart - bivariate_bmi_vs_charges.png</a:t>
+              <a:t>Chart - bivariate_bmi_vs_children.png</a:t>
             </a:r>
           </a:p>
         </p:txBody>
       </p:sp>
       <p:pic>
         <p:nvPicPr>
-          <p:cNvPr id="3" name="Picture 2" descr="bivariate_bmi_vs_charges.png"/>
+          <p:cNvPr id="3" name="Picture 2" descr="bivariate_bmi_vs_children.png"/>
           <p:cNvPicPr>
             <a:picLocks noChangeAspect="1"/>
           </p:cNvPicPr>
@@ -4047,14 +3871,14 @@
           <a:lstStyle/>
           <a:p>
             <a:r>
-              <a:t>Chart - bivariate_bmi_vs_children.png</a:t>
+              <a:t>Chart - bivariate_children_vs_charges.png</a:t>
             </a:r>
           </a:p>
         </p:txBody>
       </p:sp>
       <p:pic>
         <p:nvPicPr>
-          <p:cNvPr id="3" name="Picture 2" descr="bivariate_bmi_vs_children.png"/>
+          <p:cNvPr id="3" name="Picture 2" descr="bivariate_children_vs_charges.png"/>
           <p:cNvPicPr>
             <a:picLocks noChangeAspect="1"/>
           </p:cNvPicPr>
@@ -4110,14 +3934,14 @@
           <a:lstStyle/>
           <a:p>
             <a:r>
-              <a:t>Chart - bivariate_children_vs_charges.png</a:t>
+              <a:t>Chart - correlation_matrix.png</a:t>
             </a:r>
           </a:p>
         </p:txBody>
       </p:sp>
       <p:pic>
         <p:nvPicPr>
-          <p:cNvPr id="3" name="Picture 2" descr="bivariate_children_vs_charges.png"/>
+          <p:cNvPr id="3" name="Picture 2" descr="correlation_matrix.png"/>
           <p:cNvPicPr>
             <a:picLocks noChangeAspect="1"/>
           </p:cNvPicPr>
@@ -4132,7 +3956,7 @@
         <p:spPr>
           <a:xfrm>
             <a:off x="914400" y="1371600"/>
-            <a:ext cx="8229600" cy="4937760"/>
+            <a:ext cx="8229600" cy="5486400"/>
           </a:xfrm>
           <a:prstGeom prst="rect">
             <a:avLst/>
@@ -4173,14 +3997,14 @@
           <a:lstStyle/>
           <a:p>
             <a:r>
-              <a:t>Chart - correlation_matrix.png</a:t>
+              <a:t>Chart - univariate_age.png</a:t>
             </a:r>
           </a:p>
         </p:txBody>
       </p:sp>
       <p:pic>
         <p:nvPicPr>
-          <p:cNvPr id="3" name="Picture 2" descr="correlation_matrix.png"/>
+          <p:cNvPr id="3" name="Picture 2" descr="univariate_age.png"/>
           <p:cNvPicPr>
             <a:picLocks noChangeAspect="1"/>
           </p:cNvPicPr>
@@ -4195,7 +4019,7 @@
         <p:spPr>
           <a:xfrm>
             <a:off x="914400" y="1371600"/>
-            <a:ext cx="8229600" cy="5486400"/>
+            <a:ext cx="8229600" cy="4937760"/>
           </a:xfrm>
           <a:prstGeom prst="rect">
             <a:avLst/>

</xml_diff>

<commit_message>
#7 made formatting changes in the slides
</commit_message>
<xml_diff>
--- a/src/output/eda_presentation.pptx
+++ b/src/output/eda_presentation.pptx
@@ -5,23 +5,23 @@
     <p:sldMasterId id="2147483648" r:id="rId1"/>
   </p:sldMasterIdLst>
   <p:sldIdLst>
-    <p:sldId id="256" r:id="rId7"/>
-    <p:sldId id="257" r:id="rId8"/>
-    <p:sldId id="258" r:id="rId9"/>
-    <p:sldId id="259" r:id="rId10"/>
-    <p:sldId id="260" r:id="rId11"/>
-    <p:sldId id="261" r:id="rId12"/>
-    <p:sldId id="262" r:id="rId13"/>
-    <p:sldId id="263" r:id="rId14"/>
-    <p:sldId id="264" r:id="rId15"/>
-    <p:sldId id="265" r:id="rId16"/>
-    <p:sldId id="266" r:id="rId17"/>
-    <p:sldId id="267" r:id="rId18"/>
-    <p:sldId id="268" r:id="rId19"/>
-    <p:sldId id="269" r:id="rId20"/>
-    <p:sldId id="270" r:id="rId21"/>
+    <p:sldId id="256" r:id="rId2"/>
+    <p:sldId id="257" r:id="rId3"/>
+    <p:sldId id="258" r:id="rId4"/>
+    <p:sldId id="259" r:id="rId5"/>
+    <p:sldId id="260" r:id="rId6"/>
+    <p:sldId id="261" r:id="rId7"/>
+    <p:sldId id="262" r:id="rId8"/>
+    <p:sldId id="263" r:id="rId9"/>
+    <p:sldId id="264" r:id="rId10"/>
+    <p:sldId id="265" r:id="rId11"/>
+    <p:sldId id="266" r:id="rId12"/>
+    <p:sldId id="267" r:id="rId13"/>
+    <p:sldId id="268" r:id="rId14"/>
+    <p:sldId id="269" r:id="rId15"/>
+    <p:sldId id="270" r:id="rId16"/>
   </p:sldIdLst>
-  <p:sldSz cx="12191969" cy="6858000" type="screen4x3"/>
+  <p:sldSz cx="12192000" cy="6858000"/>
   <p:notesSz cx="6858000" cy="9144000"/>
   <p:defaultTextStyle>
     <a:defPPr>
@@ -118,6 +118,22 @@
       </a:defRPr>
     </a:lvl9pPr>
   </p:defaultTextStyle>
+  <p:extLst>
+    <p:ext uri="{EFAFB233-063F-42B5-8137-9DF3F51BA10A}">
+      <p15:sldGuideLst xmlns:p15="http://schemas.microsoft.com/office/powerpoint/2012/main">
+        <p15:guide id="1" orient="horz" pos="2160">
+          <p15:clr>
+            <a:srgbClr val="A4A3A4"/>
+          </p15:clr>
+        </p15:guide>
+        <p15:guide id="2" pos="2880">
+          <p15:clr>
+            <a:srgbClr val="A4A3A4"/>
+          </p15:clr>
+        </p15:guide>
+      </p15:sldGuideLst>
+    </p:ext>
+  </p:extLst>
 </p:presentation>
 </file>
 
@@ -159,10 +175,9 @@
           <a:lstStyle/>
           <a:p>
             <a:r>
-              <a:rPr lang="en-US" smtClean="0"/>
+              <a:rPr lang="en-US"/>
               <a:t>Click to edit Master title style</a:t>
             </a:r>
-            <a:endParaRPr lang="en-US"/>
           </a:p>
         </p:txBody>
       </p:sp>
@@ -278,10 +293,9 @@
           </a:lstStyle>
           <a:p>
             <a:r>
-              <a:rPr lang="en-US" smtClean="0"/>
+              <a:rPr lang="en-US"/>
               <a:t>Click to edit Master subtitle style</a:t>
             </a:r>
-            <a:endParaRPr lang="en-US"/>
           </a:p>
         </p:txBody>
       </p:sp>
@@ -302,7 +316,7 @@
           <a:p>
             <a:fld id="{5BCAD085-E8A6-8845-BD4E-CB4CCA059FC4}" type="datetimeFigureOut">
               <a:rPr lang="en-US" smtClean="0"/>
-              <a:t>1/27/13</a:t>
+              <a:t>10/5/2024</a:t>
             </a:fld>
             <a:endParaRPr lang="en-US"/>
           </a:p>
@@ -396,10 +410,9 @@
           <a:lstStyle/>
           <a:p>
             <a:r>
-              <a:rPr lang="en-US" smtClean="0"/>
+              <a:rPr lang="en-US"/>
               <a:t>Click to edit Master title style</a:t>
             </a:r>
-            <a:endParaRPr lang="en-US"/>
           </a:p>
         </p:txBody>
       </p:sp>
@@ -420,38 +433,37 @@
           <a:p>
             <a:pPr lvl="0"/>
             <a:r>
-              <a:rPr lang="en-US" smtClean="0"/>
+              <a:rPr lang="en-US"/>
               <a:t>Click to edit Master text styles</a:t>
             </a:r>
           </a:p>
           <a:p>
             <a:pPr lvl="1"/>
             <a:r>
-              <a:rPr lang="en-US" smtClean="0"/>
+              <a:rPr lang="en-US"/>
               <a:t>Second level</a:t>
             </a:r>
           </a:p>
           <a:p>
             <a:pPr lvl="2"/>
             <a:r>
-              <a:rPr lang="en-US" smtClean="0"/>
+              <a:rPr lang="en-US"/>
               <a:t>Third level</a:t>
             </a:r>
           </a:p>
           <a:p>
             <a:pPr lvl="3"/>
             <a:r>
-              <a:rPr lang="en-US" smtClean="0"/>
+              <a:rPr lang="en-US"/>
               <a:t>Fourth level</a:t>
             </a:r>
           </a:p>
           <a:p>
             <a:pPr lvl="4"/>
             <a:r>
-              <a:rPr lang="en-US" smtClean="0"/>
+              <a:rPr lang="en-US"/>
               <a:t>Fifth level</a:t>
             </a:r>
-            <a:endParaRPr lang="en-US"/>
           </a:p>
         </p:txBody>
       </p:sp>
@@ -472,7 +484,7 @@
           <a:p>
             <a:fld id="{5BCAD085-E8A6-8845-BD4E-CB4CCA059FC4}" type="datetimeFigureOut">
               <a:rPr lang="en-US" smtClean="0"/>
-              <a:t>1/27/13</a:t>
+              <a:t>10/5/2024</a:t>
             </a:fld>
             <a:endParaRPr lang="en-US"/>
           </a:p>
@@ -571,10 +583,9 @@
           <a:lstStyle/>
           <a:p>
             <a:r>
-              <a:rPr lang="en-US" smtClean="0"/>
+              <a:rPr lang="en-US"/>
               <a:t>Click to edit Master title style</a:t>
             </a:r>
-            <a:endParaRPr lang="en-US"/>
           </a:p>
         </p:txBody>
       </p:sp>
@@ -600,38 +611,37 @@
           <a:p>
             <a:pPr lvl="0"/>
             <a:r>
-              <a:rPr lang="en-US" smtClean="0"/>
+              <a:rPr lang="en-US"/>
               <a:t>Click to edit Master text styles</a:t>
             </a:r>
           </a:p>
           <a:p>
             <a:pPr lvl="1"/>
             <a:r>
-              <a:rPr lang="en-US" smtClean="0"/>
+              <a:rPr lang="en-US"/>
               <a:t>Second level</a:t>
             </a:r>
           </a:p>
           <a:p>
             <a:pPr lvl="2"/>
             <a:r>
-              <a:rPr lang="en-US" smtClean="0"/>
+              <a:rPr lang="en-US"/>
               <a:t>Third level</a:t>
             </a:r>
           </a:p>
           <a:p>
             <a:pPr lvl="3"/>
             <a:r>
-              <a:rPr lang="en-US" smtClean="0"/>
+              <a:rPr lang="en-US"/>
               <a:t>Fourth level</a:t>
             </a:r>
           </a:p>
           <a:p>
             <a:pPr lvl="4"/>
             <a:r>
-              <a:rPr lang="en-US" smtClean="0"/>
+              <a:rPr lang="en-US"/>
               <a:t>Fifth level</a:t>
             </a:r>
-            <a:endParaRPr lang="en-US"/>
           </a:p>
         </p:txBody>
       </p:sp>
@@ -652,7 +662,7 @@
           <a:p>
             <a:fld id="{5BCAD085-E8A6-8845-BD4E-CB4CCA059FC4}" type="datetimeFigureOut">
               <a:rPr lang="en-US" smtClean="0"/>
-              <a:t>1/27/13</a:t>
+              <a:t>10/5/2024</a:t>
             </a:fld>
             <a:endParaRPr lang="en-US"/>
           </a:p>
@@ -746,10 +756,9 @@
           <a:lstStyle/>
           <a:p>
             <a:r>
-              <a:rPr lang="en-US" smtClean="0"/>
+              <a:rPr lang="en-US"/>
               <a:t>Click to edit Master title style</a:t>
             </a:r>
-            <a:endParaRPr lang="en-US"/>
           </a:p>
         </p:txBody>
       </p:sp>
@@ -770,38 +779,37 @@
           <a:p>
             <a:pPr lvl="0"/>
             <a:r>
-              <a:rPr lang="en-US" smtClean="0"/>
+              <a:rPr lang="en-US"/>
               <a:t>Click to edit Master text styles</a:t>
             </a:r>
           </a:p>
           <a:p>
             <a:pPr lvl="1"/>
             <a:r>
-              <a:rPr lang="en-US" smtClean="0"/>
+              <a:rPr lang="en-US"/>
               <a:t>Second level</a:t>
             </a:r>
           </a:p>
           <a:p>
             <a:pPr lvl="2"/>
             <a:r>
-              <a:rPr lang="en-US" smtClean="0"/>
+              <a:rPr lang="en-US"/>
               <a:t>Third level</a:t>
             </a:r>
           </a:p>
           <a:p>
             <a:pPr lvl="3"/>
             <a:r>
-              <a:rPr lang="en-US" smtClean="0"/>
+              <a:rPr lang="en-US"/>
               <a:t>Fourth level</a:t>
             </a:r>
           </a:p>
           <a:p>
             <a:pPr lvl="4"/>
             <a:r>
-              <a:rPr lang="en-US" smtClean="0"/>
+              <a:rPr lang="en-US"/>
               <a:t>Fifth level</a:t>
             </a:r>
-            <a:endParaRPr lang="en-US"/>
           </a:p>
         </p:txBody>
       </p:sp>
@@ -822,7 +830,7 @@
           <a:p>
             <a:fld id="{5BCAD085-E8A6-8845-BD4E-CB4CCA059FC4}" type="datetimeFigureOut">
               <a:rPr lang="en-US" smtClean="0"/>
-              <a:t>1/27/13</a:t>
+              <a:t>10/5/2024</a:t>
             </a:fld>
             <a:endParaRPr lang="en-US"/>
           </a:p>
@@ -925,10 +933,9 @@
           </a:lstStyle>
           <a:p>
             <a:r>
-              <a:rPr lang="en-US" smtClean="0"/>
+              <a:rPr lang="en-US"/>
               <a:t>Click to edit Master title style</a:t>
             </a:r>
-            <a:endParaRPr lang="en-US"/>
           </a:p>
         </p:txBody>
       </p:sp>
@@ -1045,7 +1052,7 @@
           <a:p>
             <a:pPr lvl="0"/>
             <a:r>
-              <a:rPr lang="en-US" smtClean="0"/>
+              <a:rPr lang="en-US"/>
               <a:t>Click to edit Master text styles</a:t>
             </a:r>
           </a:p>
@@ -1068,7 +1075,7 @@
           <a:p>
             <a:fld id="{5BCAD085-E8A6-8845-BD4E-CB4CCA059FC4}" type="datetimeFigureOut">
               <a:rPr lang="en-US" smtClean="0"/>
-              <a:t>1/27/13</a:t>
+              <a:t>10/5/2024</a:t>
             </a:fld>
             <a:endParaRPr lang="en-US"/>
           </a:p>
@@ -1162,10 +1169,9 @@
           <a:lstStyle/>
           <a:p>
             <a:r>
-              <a:rPr lang="en-US" smtClean="0"/>
+              <a:rPr lang="en-US"/>
               <a:t>Click to edit Master title style</a:t>
             </a:r>
-            <a:endParaRPr lang="en-US"/>
           </a:p>
         </p:txBody>
       </p:sp>
@@ -1219,38 +1225,37 @@
           <a:p>
             <a:pPr lvl="0"/>
             <a:r>
-              <a:rPr lang="en-US" smtClean="0"/>
+              <a:rPr lang="en-US"/>
               <a:t>Click to edit Master text styles</a:t>
             </a:r>
           </a:p>
           <a:p>
             <a:pPr lvl="1"/>
             <a:r>
-              <a:rPr lang="en-US" smtClean="0"/>
+              <a:rPr lang="en-US"/>
               <a:t>Second level</a:t>
             </a:r>
           </a:p>
           <a:p>
             <a:pPr lvl="2"/>
             <a:r>
-              <a:rPr lang="en-US" smtClean="0"/>
+              <a:rPr lang="en-US"/>
               <a:t>Third level</a:t>
             </a:r>
           </a:p>
           <a:p>
             <a:pPr lvl="3"/>
             <a:r>
-              <a:rPr lang="en-US" smtClean="0"/>
+              <a:rPr lang="en-US"/>
               <a:t>Fourth level</a:t>
             </a:r>
           </a:p>
           <a:p>
             <a:pPr lvl="4"/>
             <a:r>
-              <a:rPr lang="en-US" smtClean="0"/>
+              <a:rPr lang="en-US"/>
               <a:t>Fifth level</a:t>
             </a:r>
-            <a:endParaRPr lang="en-US"/>
           </a:p>
         </p:txBody>
       </p:sp>
@@ -1304,38 +1309,37 @@
           <a:p>
             <a:pPr lvl="0"/>
             <a:r>
-              <a:rPr lang="en-US" smtClean="0"/>
+              <a:rPr lang="en-US"/>
               <a:t>Click to edit Master text styles</a:t>
             </a:r>
           </a:p>
           <a:p>
             <a:pPr lvl="1"/>
             <a:r>
-              <a:rPr lang="en-US" smtClean="0"/>
+              <a:rPr lang="en-US"/>
               <a:t>Second level</a:t>
             </a:r>
           </a:p>
           <a:p>
             <a:pPr lvl="2"/>
             <a:r>
-              <a:rPr lang="en-US" smtClean="0"/>
+              <a:rPr lang="en-US"/>
               <a:t>Third level</a:t>
             </a:r>
           </a:p>
           <a:p>
             <a:pPr lvl="3"/>
             <a:r>
-              <a:rPr lang="en-US" smtClean="0"/>
+              <a:rPr lang="en-US"/>
               <a:t>Fourth level</a:t>
             </a:r>
           </a:p>
           <a:p>
             <a:pPr lvl="4"/>
             <a:r>
-              <a:rPr lang="en-US" smtClean="0"/>
+              <a:rPr lang="en-US"/>
               <a:t>Fifth level</a:t>
             </a:r>
-            <a:endParaRPr lang="en-US"/>
           </a:p>
         </p:txBody>
       </p:sp>
@@ -1356,7 +1360,7 @@
           <a:p>
             <a:fld id="{5BCAD085-E8A6-8845-BD4E-CB4CCA059FC4}" type="datetimeFigureOut">
               <a:rPr lang="en-US" smtClean="0"/>
-              <a:t>1/27/13</a:t>
+              <a:t>10/5/2024</a:t>
             </a:fld>
             <a:endParaRPr lang="en-US"/>
           </a:p>
@@ -1454,10 +1458,9 @@
           </a:lstStyle>
           <a:p>
             <a:r>
-              <a:rPr lang="en-US" smtClean="0"/>
+              <a:rPr lang="en-US"/>
               <a:t>Click to edit Master title style</a:t>
             </a:r>
-            <a:endParaRPr lang="en-US"/>
           </a:p>
         </p:txBody>
       </p:sp>
@@ -1520,7 +1523,7 @@
           <a:p>
             <a:pPr lvl="0"/>
             <a:r>
-              <a:rPr lang="en-US" smtClean="0"/>
+              <a:rPr lang="en-US"/>
               <a:t>Click to edit Master text styles</a:t>
             </a:r>
           </a:p>
@@ -1576,38 +1579,37 @@
           <a:p>
             <a:pPr lvl="0"/>
             <a:r>
-              <a:rPr lang="en-US" smtClean="0"/>
+              <a:rPr lang="en-US"/>
               <a:t>Click to edit Master text styles</a:t>
             </a:r>
           </a:p>
           <a:p>
             <a:pPr lvl="1"/>
             <a:r>
-              <a:rPr lang="en-US" smtClean="0"/>
+              <a:rPr lang="en-US"/>
               <a:t>Second level</a:t>
             </a:r>
           </a:p>
           <a:p>
             <a:pPr lvl="2"/>
             <a:r>
-              <a:rPr lang="en-US" smtClean="0"/>
+              <a:rPr lang="en-US"/>
               <a:t>Third level</a:t>
             </a:r>
           </a:p>
           <a:p>
             <a:pPr lvl="3"/>
             <a:r>
-              <a:rPr lang="en-US" smtClean="0"/>
+              <a:rPr lang="en-US"/>
               <a:t>Fourth level</a:t>
             </a:r>
           </a:p>
           <a:p>
             <a:pPr lvl="4"/>
             <a:r>
-              <a:rPr lang="en-US" smtClean="0"/>
+              <a:rPr lang="en-US"/>
               <a:t>Fifth level</a:t>
             </a:r>
-            <a:endParaRPr lang="en-US"/>
           </a:p>
         </p:txBody>
       </p:sp>
@@ -1670,7 +1672,7 @@
           <a:p>
             <a:pPr lvl="0"/>
             <a:r>
-              <a:rPr lang="en-US" smtClean="0"/>
+              <a:rPr lang="en-US"/>
               <a:t>Click to edit Master text styles</a:t>
             </a:r>
           </a:p>
@@ -1726,38 +1728,37 @@
           <a:p>
             <a:pPr lvl="0"/>
             <a:r>
-              <a:rPr lang="en-US" smtClean="0"/>
+              <a:rPr lang="en-US"/>
               <a:t>Click to edit Master text styles</a:t>
             </a:r>
           </a:p>
           <a:p>
             <a:pPr lvl="1"/>
             <a:r>
-              <a:rPr lang="en-US" smtClean="0"/>
+              <a:rPr lang="en-US"/>
               <a:t>Second level</a:t>
             </a:r>
           </a:p>
           <a:p>
             <a:pPr lvl="2"/>
             <a:r>
-              <a:rPr lang="en-US" smtClean="0"/>
+              <a:rPr lang="en-US"/>
               <a:t>Third level</a:t>
             </a:r>
           </a:p>
           <a:p>
             <a:pPr lvl="3"/>
             <a:r>
-              <a:rPr lang="en-US" smtClean="0"/>
+              <a:rPr lang="en-US"/>
               <a:t>Fourth level</a:t>
             </a:r>
           </a:p>
           <a:p>
             <a:pPr lvl="4"/>
             <a:r>
-              <a:rPr lang="en-US" smtClean="0"/>
+              <a:rPr lang="en-US"/>
               <a:t>Fifth level</a:t>
             </a:r>
-            <a:endParaRPr lang="en-US"/>
           </a:p>
         </p:txBody>
       </p:sp>
@@ -1778,7 +1779,7 @@
           <a:p>
             <a:fld id="{5BCAD085-E8A6-8845-BD4E-CB4CCA059FC4}" type="datetimeFigureOut">
               <a:rPr lang="en-US" smtClean="0"/>
-              <a:t>1/27/13</a:t>
+              <a:t>10/5/2024</a:t>
             </a:fld>
             <a:endParaRPr lang="en-US"/>
           </a:p>
@@ -1872,10 +1873,9 @@
           <a:lstStyle/>
           <a:p>
             <a:r>
-              <a:rPr lang="en-US" smtClean="0"/>
+              <a:rPr lang="en-US"/>
               <a:t>Click to edit Master title style</a:t>
             </a:r>
-            <a:endParaRPr lang="en-US"/>
           </a:p>
         </p:txBody>
       </p:sp>
@@ -1896,7 +1896,7 @@
           <a:p>
             <a:fld id="{5BCAD085-E8A6-8845-BD4E-CB4CCA059FC4}" type="datetimeFigureOut">
               <a:rPr lang="en-US" smtClean="0"/>
-              <a:t>1/27/13</a:t>
+              <a:t>10/5/2024</a:t>
             </a:fld>
             <a:endParaRPr lang="en-US"/>
           </a:p>
@@ -1991,7 +1991,7 @@
           <a:p>
             <a:fld id="{5BCAD085-E8A6-8845-BD4E-CB4CCA059FC4}" type="datetimeFigureOut">
               <a:rPr lang="en-US" smtClean="0"/>
-              <a:t>1/27/13</a:t>
+              <a:t>10/5/2024</a:t>
             </a:fld>
             <a:endParaRPr lang="en-US"/>
           </a:p>
@@ -2094,10 +2094,9 @@
           </a:lstStyle>
           <a:p>
             <a:r>
-              <a:rPr lang="en-US" smtClean="0"/>
+              <a:rPr lang="en-US"/>
               <a:t>Click to edit Master title style</a:t>
             </a:r>
-            <a:endParaRPr lang="en-US"/>
           </a:p>
         </p:txBody>
       </p:sp>
@@ -2151,38 +2150,37 @@
           <a:p>
             <a:pPr lvl="0"/>
             <a:r>
-              <a:rPr lang="en-US" smtClean="0"/>
+              <a:rPr lang="en-US"/>
               <a:t>Click to edit Master text styles</a:t>
             </a:r>
           </a:p>
           <a:p>
             <a:pPr lvl="1"/>
             <a:r>
-              <a:rPr lang="en-US" smtClean="0"/>
+              <a:rPr lang="en-US"/>
               <a:t>Second level</a:t>
             </a:r>
           </a:p>
           <a:p>
             <a:pPr lvl="2"/>
             <a:r>
-              <a:rPr lang="en-US" smtClean="0"/>
+              <a:rPr lang="en-US"/>
               <a:t>Third level</a:t>
             </a:r>
           </a:p>
           <a:p>
             <a:pPr lvl="3"/>
             <a:r>
-              <a:rPr lang="en-US" smtClean="0"/>
+              <a:rPr lang="en-US"/>
               <a:t>Fourth level</a:t>
             </a:r>
           </a:p>
           <a:p>
             <a:pPr lvl="4"/>
             <a:r>
-              <a:rPr lang="en-US" smtClean="0"/>
+              <a:rPr lang="en-US"/>
               <a:t>Fifth level</a:t>
             </a:r>
-            <a:endParaRPr lang="en-US"/>
           </a:p>
         </p:txBody>
       </p:sp>
@@ -2245,7 +2243,7 @@
           <a:p>
             <a:pPr lvl="0"/>
             <a:r>
-              <a:rPr lang="en-US" smtClean="0"/>
+              <a:rPr lang="en-US"/>
               <a:t>Click to edit Master text styles</a:t>
             </a:r>
           </a:p>
@@ -2268,7 +2266,7 @@
           <a:p>
             <a:fld id="{5BCAD085-E8A6-8845-BD4E-CB4CCA059FC4}" type="datetimeFigureOut">
               <a:rPr lang="en-US" smtClean="0"/>
-              <a:t>1/27/13</a:t>
+              <a:t>10/5/2024</a:t>
             </a:fld>
             <a:endParaRPr lang="en-US"/>
           </a:p>
@@ -2371,10 +2369,9 @@
           </a:lstStyle>
           <a:p>
             <a:r>
-              <a:rPr lang="en-US" smtClean="0"/>
+              <a:rPr lang="en-US"/>
               <a:t>Click to edit Master title style</a:t>
             </a:r>
-            <a:endParaRPr lang="en-US"/>
           </a:p>
         </p:txBody>
       </p:sp>
@@ -2498,7 +2495,7 @@
           <a:p>
             <a:pPr lvl="0"/>
             <a:r>
-              <a:rPr lang="en-US" smtClean="0"/>
+              <a:rPr lang="en-US"/>
               <a:t>Click to edit Master text styles</a:t>
             </a:r>
           </a:p>
@@ -2521,7 +2518,7 @@
           <a:p>
             <a:fld id="{5BCAD085-E8A6-8845-BD4E-CB4CCA059FC4}" type="datetimeFigureOut">
               <a:rPr lang="en-US" smtClean="0"/>
-              <a:t>1/27/13</a:t>
+              <a:t>10/5/2024</a:t>
             </a:fld>
             <a:endParaRPr lang="en-US"/>
           </a:p>
@@ -2630,10 +2627,9 @@
           <a:lstStyle/>
           <a:p>
             <a:r>
-              <a:rPr lang="en-US" smtClean="0"/>
+              <a:rPr lang="en-US"/>
               <a:t>Click to edit Master title style</a:t>
             </a:r>
-            <a:endParaRPr lang="en-US"/>
           </a:p>
         </p:txBody>
       </p:sp>
@@ -2664,38 +2660,37 @@
           <a:p>
             <a:pPr lvl="0"/>
             <a:r>
-              <a:rPr lang="en-US" smtClean="0"/>
+              <a:rPr lang="en-US"/>
               <a:t>Click to edit Master text styles</a:t>
             </a:r>
           </a:p>
           <a:p>
             <a:pPr lvl="1"/>
             <a:r>
-              <a:rPr lang="en-US" smtClean="0"/>
+              <a:rPr lang="en-US"/>
               <a:t>Second level</a:t>
             </a:r>
           </a:p>
           <a:p>
             <a:pPr lvl="2"/>
             <a:r>
-              <a:rPr lang="en-US" smtClean="0"/>
+              <a:rPr lang="en-US"/>
               <a:t>Third level</a:t>
             </a:r>
           </a:p>
           <a:p>
             <a:pPr lvl="3"/>
             <a:r>
-              <a:rPr lang="en-US" smtClean="0"/>
+              <a:rPr lang="en-US"/>
               <a:t>Fourth level</a:t>
             </a:r>
           </a:p>
           <a:p>
             <a:pPr lvl="4"/>
             <a:r>
-              <a:rPr lang="en-US" smtClean="0"/>
+              <a:rPr lang="en-US"/>
               <a:t>Fifth level</a:t>
             </a:r>
-            <a:endParaRPr lang="en-US"/>
           </a:p>
         </p:txBody>
       </p:sp>
@@ -2734,7 +2729,7 @@
           <a:p>
             <a:fld id="{5BCAD085-E8A6-8845-BD4E-CB4CCA059FC4}" type="datetimeFigureOut">
               <a:rPr lang="en-US" smtClean="0"/>
-              <a:t>1/27/13</a:t>
+              <a:t>10/5/2024</a:t>
             </a:fld>
             <a:endParaRPr lang="en-US"/>
           </a:p>
@@ -3093,7 +3088,7 @@
 </file>
 
 <file path=ppt/slides/slide1.xml><?xml version="1.0" encoding="utf-8"?>
-<p:sld xmlns:a="http://schemas.openxmlformats.org/drawingml/2006/main" xmlns:p="http://schemas.openxmlformats.org/presentationml/2006/main" xmlns:r="http://schemas.openxmlformats.org/officeDocument/2006/relationships">
+<p:sld xmlns:a="http://schemas.openxmlformats.org/drawingml/2006/main" xmlns:r="http://schemas.openxmlformats.org/officeDocument/2006/relationships" xmlns:p="http://schemas.openxmlformats.org/presentationml/2006/main">
   <p:cSld>
     <p:spTree>
       <p:nvGrpSpPr>
@@ -3101,7 +3096,14 @@
         <p:cNvGrpSpPr/>
         <p:nvPr/>
       </p:nvGrpSpPr>
-      <p:grpSpPr/>
+      <p:grpSpPr>
+        <a:xfrm>
+          <a:off x="0" y="0"/>
+          <a:ext cx="0" cy="0"/>
+          <a:chOff x="0" y="0"/>
+          <a:chExt cx="0" cy="0"/>
+        </a:xfrm>
+      </p:grpSpPr>
       <p:sp>
         <p:nvSpPr>
           <p:cNvPr id="2" name="Title 1"/>
@@ -3118,7 +3120,8 @@
           <a:lstStyle/>
           <a:p>
             <a:r>
-              <a:t>Exploratory Data Analysis</a:t>
+              <a:rPr b="1"/>
+              <a:t>EXPLORATORY DATA ANALYSIS</a:t>
             </a:r>
           </a:p>
         </p:txBody>
@@ -3139,7 +3142,8 @@
           <a:lstStyle/>
           <a:p>
             <a:r>
-              <a:t>Insights from the Dataset</a:t>
+              <a:rPr b="1"/>
+              <a:t>MADE BY DORA</a:t>
             </a:r>
           </a:p>
         </p:txBody>
@@ -3153,7 +3157,7 @@
 </file>
 
 <file path=ppt/slides/slide10.xml><?xml version="1.0" encoding="utf-8"?>
-<p:sld xmlns:a="http://schemas.openxmlformats.org/drawingml/2006/main" xmlns:p="http://schemas.openxmlformats.org/presentationml/2006/main" xmlns:r="http://schemas.openxmlformats.org/officeDocument/2006/relationships">
+<p:sld xmlns:a="http://schemas.openxmlformats.org/drawingml/2006/main" xmlns:r="http://schemas.openxmlformats.org/officeDocument/2006/relationships" xmlns:p="http://schemas.openxmlformats.org/presentationml/2006/main">
   <p:cSld>
     <p:spTree>
       <p:nvGrpSpPr>
@@ -3161,7 +3165,14 @@
         <p:cNvGrpSpPr/>
         <p:nvPr/>
       </p:nvGrpSpPr>
-      <p:grpSpPr/>
+      <p:grpSpPr>
+        <a:xfrm>
+          <a:off x="0" y="0"/>
+          <a:ext cx="0" cy="0"/>
+          <a:chOff x="0" y="0"/>
+          <a:chExt cx="0" cy="0"/>
+        </a:xfrm>
+      </p:grpSpPr>
       <p:sp>
         <p:nvSpPr>
           <p:cNvPr id="2" name="Title 1"/>
@@ -3178,7 +3189,8 @@
           <a:lstStyle/>
           <a:p>
             <a:r>
-              <a:t>Chart - univariate_bmi.png</a:t>
+              <a:rPr b="1"/>
+              <a:t>CHART: UNIVARIATE BMI</a:t>
             </a:r>
           </a:p>
         </p:txBody>
@@ -3216,7 +3228,7 @@
 </file>
 
 <file path=ppt/slides/slide11.xml><?xml version="1.0" encoding="utf-8"?>
-<p:sld xmlns:a="http://schemas.openxmlformats.org/drawingml/2006/main" xmlns:p="http://schemas.openxmlformats.org/presentationml/2006/main" xmlns:r="http://schemas.openxmlformats.org/officeDocument/2006/relationships">
+<p:sld xmlns:a="http://schemas.openxmlformats.org/drawingml/2006/main" xmlns:r="http://schemas.openxmlformats.org/officeDocument/2006/relationships" xmlns:p="http://schemas.openxmlformats.org/presentationml/2006/main">
   <p:cSld>
     <p:spTree>
       <p:nvGrpSpPr>
@@ -3224,7 +3236,14 @@
         <p:cNvGrpSpPr/>
         <p:nvPr/>
       </p:nvGrpSpPr>
-      <p:grpSpPr/>
+      <p:grpSpPr>
+        <a:xfrm>
+          <a:off x="0" y="0"/>
+          <a:ext cx="0" cy="0"/>
+          <a:chOff x="0" y="0"/>
+          <a:chExt cx="0" cy="0"/>
+        </a:xfrm>
+      </p:grpSpPr>
       <p:sp>
         <p:nvSpPr>
           <p:cNvPr id="2" name="Title 1"/>
@@ -3241,7 +3260,8 @@
           <a:lstStyle/>
           <a:p>
             <a:r>
-              <a:t>Chart - univariate_charges.png</a:t>
+              <a:rPr b="1"/>
+              <a:t>CHART: UNIVARIATE CHARGES</a:t>
             </a:r>
           </a:p>
         </p:txBody>
@@ -3279,7 +3299,7 @@
 </file>
 
 <file path=ppt/slides/slide12.xml><?xml version="1.0" encoding="utf-8"?>
-<p:sld xmlns:a="http://schemas.openxmlformats.org/drawingml/2006/main" xmlns:p="http://schemas.openxmlformats.org/presentationml/2006/main" xmlns:r="http://schemas.openxmlformats.org/officeDocument/2006/relationships">
+<p:sld xmlns:a="http://schemas.openxmlformats.org/drawingml/2006/main" xmlns:r="http://schemas.openxmlformats.org/officeDocument/2006/relationships" xmlns:p="http://schemas.openxmlformats.org/presentationml/2006/main">
   <p:cSld>
     <p:spTree>
       <p:nvGrpSpPr>
@@ -3287,7 +3307,14 @@
         <p:cNvGrpSpPr/>
         <p:nvPr/>
       </p:nvGrpSpPr>
-      <p:grpSpPr/>
+      <p:grpSpPr>
+        <a:xfrm>
+          <a:off x="0" y="0"/>
+          <a:ext cx="0" cy="0"/>
+          <a:chOff x="0" y="0"/>
+          <a:chExt cx="0" cy="0"/>
+        </a:xfrm>
+      </p:grpSpPr>
       <p:sp>
         <p:nvSpPr>
           <p:cNvPr id="2" name="Title 1"/>
@@ -3304,7 +3331,8 @@
           <a:lstStyle/>
           <a:p>
             <a:r>
-              <a:t>Chart - univariate_children.png</a:t>
+              <a:rPr b="1"/>
+              <a:t>CHART: UNIVARIATE CHILDREN</a:t>
             </a:r>
           </a:p>
         </p:txBody>
@@ -3342,7 +3370,7 @@
 </file>
 
 <file path=ppt/slides/slide13.xml><?xml version="1.0" encoding="utf-8"?>
-<p:sld xmlns:a="http://schemas.openxmlformats.org/drawingml/2006/main" xmlns:p="http://schemas.openxmlformats.org/presentationml/2006/main" xmlns:r="http://schemas.openxmlformats.org/officeDocument/2006/relationships">
+<p:sld xmlns:a="http://schemas.openxmlformats.org/drawingml/2006/main" xmlns:r="http://schemas.openxmlformats.org/officeDocument/2006/relationships" xmlns:p="http://schemas.openxmlformats.org/presentationml/2006/main">
   <p:cSld>
     <p:spTree>
       <p:nvGrpSpPr>
@@ -3350,7 +3378,14 @@
         <p:cNvGrpSpPr/>
         <p:nvPr/>
       </p:nvGrpSpPr>
-      <p:grpSpPr/>
+      <p:grpSpPr>
+        <a:xfrm>
+          <a:off x="0" y="0"/>
+          <a:ext cx="0" cy="0"/>
+          <a:chOff x="0" y="0"/>
+          <a:chExt cx="0" cy="0"/>
+        </a:xfrm>
+      </p:grpSpPr>
       <p:sp>
         <p:nvSpPr>
           <p:cNvPr id="2" name="Title 1"/>
@@ -3367,7 +3402,8 @@
           <a:lstStyle/>
           <a:p>
             <a:r>
-              <a:t>Chart - univariate_region.png</a:t>
+              <a:rPr b="1"/>
+              <a:t>CHART: UNIVARIATE REGION</a:t>
             </a:r>
           </a:p>
         </p:txBody>
@@ -3405,7 +3441,7 @@
 </file>
 
 <file path=ppt/slides/slide14.xml><?xml version="1.0" encoding="utf-8"?>
-<p:sld xmlns:a="http://schemas.openxmlformats.org/drawingml/2006/main" xmlns:p="http://schemas.openxmlformats.org/presentationml/2006/main" xmlns:r="http://schemas.openxmlformats.org/officeDocument/2006/relationships">
+<p:sld xmlns:a="http://schemas.openxmlformats.org/drawingml/2006/main" xmlns:r="http://schemas.openxmlformats.org/officeDocument/2006/relationships" xmlns:p="http://schemas.openxmlformats.org/presentationml/2006/main">
   <p:cSld>
     <p:spTree>
       <p:nvGrpSpPr>
@@ -3413,7 +3449,14 @@
         <p:cNvGrpSpPr/>
         <p:nvPr/>
       </p:nvGrpSpPr>
-      <p:grpSpPr/>
+      <p:grpSpPr>
+        <a:xfrm>
+          <a:off x="0" y="0"/>
+          <a:ext cx="0" cy="0"/>
+          <a:chOff x="0" y="0"/>
+          <a:chExt cx="0" cy="0"/>
+        </a:xfrm>
+      </p:grpSpPr>
       <p:sp>
         <p:nvSpPr>
           <p:cNvPr id="2" name="Title 1"/>
@@ -3430,7 +3473,8 @@
           <a:lstStyle/>
           <a:p>
             <a:r>
-              <a:t>Chart - univariate_sex.png</a:t>
+              <a:rPr b="1"/>
+              <a:t>CHART: UNIVARIATE SEX</a:t>
             </a:r>
           </a:p>
         </p:txBody>
@@ -3468,7 +3512,7 @@
 </file>
 
 <file path=ppt/slides/slide15.xml><?xml version="1.0" encoding="utf-8"?>
-<p:sld xmlns:a="http://schemas.openxmlformats.org/drawingml/2006/main" xmlns:p="http://schemas.openxmlformats.org/presentationml/2006/main" xmlns:r="http://schemas.openxmlformats.org/officeDocument/2006/relationships">
+<p:sld xmlns:a="http://schemas.openxmlformats.org/drawingml/2006/main" xmlns:r="http://schemas.openxmlformats.org/officeDocument/2006/relationships" xmlns:p="http://schemas.openxmlformats.org/presentationml/2006/main">
   <p:cSld>
     <p:spTree>
       <p:nvGrpSpPr>
@@ -3476,7 +3520,14 @@
         <p:cNvGrpSpPr/>
         <p:nvPr/>
       </p:nvGrpSpPr>
-      <p:grpSpPr/>
+      <p:grpSpPr>
+        <a:xfrm>
+          <a:off x="0" y="0"/>
+          <a:ext cx="0" cy="0"/>
+          <a:chOff x="0" y="0"/>
+          <a:chExt cx="0" cy="0"/>
+        </a:xfrm>
+      </p:grpSpPr>
       <p:sp>
         <p:nvSpPr>
           <p:cNvPr id="2" name="Title 1"/>
@@ -3493,7 +3544,8 @@
           <a:lstStyle/>
           <a:p>
             <a:r>
-              <a:t>Chart - univariate_smoker.png</a:t>
+              <a:rPr b="1"/>
+              <a:t>CHART: UNIVARIATE SMOKER</a:t>
             </a:r>
           </a:p>
         </p:txBody>
@@ -3531,7 +3583,7 @@
 </file>
 
 <file path=ppt/slides/slide2.xml><?xml version="1.0" encoding="utf-8"?>
-<p:sld xmlns:a="http://schemas.openxmlformats.org/drawingml/2006/main" xmlns:p="http://schemas.openxmlformats.org/presentationml/2006/main" xmlns:r="http://schemas.openxmlformats.org/officeDocument/2006/relationships">
+<p:sld xmlns:a="http://schemas.openxmlformats.org/drawingml/2006/main" xmlns:r="http://schemas.openxmlformats.org/officeDocument/2006/relationships" xmlns:p="http://schemas.openxmlformats.org/presentationml/2006/main">
   <p:cSld>
     <p:spTree>
       <p:nvGrpSpPr>
@@ -3539,7 +3591,14 @@
         <p:cNvGrpSpPr/>
         <p:nvPr/>
       </p:nvGrpSpPr>
-      <p:grpSpPr/>
+      <p:grpSpPr>
+        <a:xfrm>
+          <a:off x="0" y="0"/>
+          <a:ext cx="0" cy="0"/>
+          <a:chOff x="0" y="0"/>
+          <a:chExt cx="0" cy="0"/>
+        </a:xfrm>
+      </p:grpSpPr>
       <p:sp>
         <p:nvSpPr>
           <p:cNvPr id="2" name="Title 1"/>
@@ -3556,7 +3615,8 @@
           <a:lstStyle/>
           <a:p>
             <a:r>
-              <a:t>Chart - bivariate_age_vs_bmi.png</a:t>
+              <a:rPr b="1"/>
+              <a:t>CHART: BIVARIATE AGE VS BMI</a:t>
             </a:r>
           </a:p>
         </p:txBody>
@@ -3594,7 +3654,7 @@
 </file>
 
 <file path=ppt/slides/slide3.xml><?xml version="1.0" encoding="utf-8"?>
-<p:sld xmlns:a="http://schemas.openxmlformats.org/drawingml/2006/main" xmlns:p="http://schemas.openxmlformats.org/presentationml/2006/main" xmlns:r="http://schemas.openxmlformats.org/officeDocument/2006/relationships">
+<p:sld xmlns:a="http://schemas.openxmlformats.org/drawingml/2006/main" xmlns:r="http://schemas.openxmlformats.org/officeDocument/2006/relationships" xmlns:p="http://schemas.openxmlformats.org/presentationml/2006/main">
   <p:cSld>
     <p:spTree>
       <p:nvGrpSpPr>
@@ -3602,7 +3662,14 @@
         <p:cNvGrpSpPr/>
         <p:nvPr/>
       </p:nvGrpSpPr>
-      <p:grpSpPr/>
+      <p:grpSpPr>
+        <a:xfrm>
+          <a:off x="0" y="0"/>
+          <a:ext cx="0" cy="0"/>
+          <a:chOff x="0" y="0"/>
+          <a:chExt cx="0" cy="0"/>
+        </a:xfrm>
+      </p:grpSpPr>
       <p:sp>
         <p:nvSpPr>
           <p:cNvPr id="2" name="Title 1"/>
@@ -3619,7 +3686,8 @@
           <a:lstStyle/>
           <a:p>
             <a:r>
-              <a:t>Chart - bivariate_age_vs_charges.png</a:t>
+              <a:rPr b="1"/>
+              <a:t>CHART: BIVARIATE AGE VS CHARGES</a:t>
             </a:r>
           </a:p>
         </p:txBody>
@@ -3657,7 +3725,7 @@
 </file>
 
 <file path=ppt/slides/slide4.xml><?xml version="1.0" encoding="utf-8"?>
-<p:sld xmlns:a="http://schemas.openxmlformats.org/drawingml/2006/main" xmlns:p="http://schemas.openxmlformats.org/presentationml/2006/main" xmlns:r="http://schemas.openxmlformats.org/officeDocument/2006/relationships">
+<p:sld xmlns:a="http://schemas.openxmlformats.org/drawingml/2006/main" xmlns:r="http://schemas.openxmlformats.org/officeDocument/2006/relationships" xmlns:p="http://schemas.openxmlformats.org/presentationml/2006/main">
   <p:cSld>
     <p:spTree>
       <p:nvGrpSpPr>
@@ -3665,7 +3733,14 @@
         <p:cNvGrpSpPr/>
         <p:nvPr/>
       </p:nvGrpSpPr>
-      <p:grpSpPr/>
+      <p:grpSpPr>
+        <a:xfrm>
+          <a:off x="0" y="0"/>
+          <a:ext cx="0" cy="0"/>
+          <a:chOff x="0" y="0"/>
+          <a:chExt cx="0" cy="0"/>
+        </a:xfrm>
+      </p:grpSpPr>
       <p:sp>
         <p:nvSpPr>
           <p:cNvPr id="2" name="Title 1"/>
@@ -3682,7 +3757,8 @@
           <a:lstStyle/>
           <a:p>
             <a:r>
-              <a:t>Chart - bivariate_age_vs_children.png</a:t>
+              <a:rPr b="1"/>
+              <a:t>CHART: BIVARIATE AGE VS CHILDREN</a:t>
             </a:r>
           </a:p>
         </p:txBody>
@@ -3720,7 +3796,7 @@
 </file>
 
 <file path=ppt/slides/slide5.xml><?xml version="1.0" encoding="utf-8"?>
-<p:sld xmlns:a="http://schemas.openxmlformats.org/drawingml/2006/main" xmlns:p="http://schemas.openxmlformats.org/presentationml/2006/main" xmlns:r="http://schemas.openxmlformats.org/officeDocument/2006/relationships">
+<p:sld xmlns:a="http://schemas.openxmlformats.org/drawingml/2006/main" xmlns:r="http://schemas.openxmlformats.org/officeDocument/2006/relationships" xmlns:p="http://schemas.openxmlformats.org/presentationml/2006/main">
   <p:cSld>
     <p:spTree>
       <p:nvGrpSpPr>
@@ -3728,7 +3804,14 @@
         <p:cNvGrpSpPr/>
         <p:nvPr/>
       </p:nvGrpSpPr>
-      <p:grpSpPr/>
+      <p:grpSpPr>
+        <a:xfrm>
+          <a:off x="0" y="0"/>
+          <a:ext cx="0" cy="0"/>
+          <a:chOff x="0" y="0"/>
+          <a:chExt cx="0" cy="0"/>
+        </a:xfrm>
+      </p:grpSpPr>
       <p:sp>
         <p:nvSpPr>
           <p:cNvPr id="2" name="Title 1"/>
@@ -3745,7 +3828,8 @@
           <a:lstStyle/>
           <a:p>
             <a:r>
-              <a:t>Chart - bivariate_bmi_vs_charges.png</a:t>
+              <a:rPr b="1"/>
+              <a:t>CHART: BIVARIATE BMI VS CHARGES</a:t>
             </a:r>
           </a:p>
         </p:txBody>
@@ -3783,7 +3867,7 @@
 </file>
 
 <file path=ppt/slides/slide6.xml><?xml version="1.0" encoding="utf-8"?>
-<p:sld xmlns:a="http://schemas.openxmlformats.org/drawingml/2006/main" xmlns:p="http://schemas.openxmlformats.org/presentationml/2006/main" xmlns:r="http://schemas.openxmlformats.org/officeDocument/2006/relationships">
+<p:sld xmlns:a="http://schemas.openxmlformats.org/drawingml/2006/main" xmlns:r="http://schemas.openxmlformats.org/officeDocument/2006/relationships" xmlns:p="http://schemas.openxmlformats.org/presentationml/2006/main">
   <p:cSld>
     <p:spTree>
       <p:nvGrpSpPr>
@@ -3791,7 +3875,14 @@
         <p:cNvGrpSpPr/>
         <p:nvPr/>
       </p:nvGrpSpPr>
-      <p:grpSpPr/>
+      <p:grpSpPr>
+        <a:xfrm>
+          <a:off x="0" y="0"/>
+          <a:ext cx="0" cy="0"/>
+          <a:chOff x="0" y="0"/>
+          <a:chExt cx="0" cy="0"/>
+        </a:xfrm>
+      </p:grpSpPr>
       <p:sp>
         <p:nvSpPr>
           <p:cNvPr id="2" name="Title 1"/>
@@ -3808,7 +3899,8 @@
           <a:lstStyle/>
           <a:p>
             <a:r>
-              <a:t>Chart - bivariate_bmi_vs_children.png</a:t>
+              <a:rPr b="1"/>
+              <a:t>CHART: BIVARIATE BMI VS CHILDREN</a:t>
             </a:r>
           </a:p>
         </p:txBody>
@@ -3846,7 +3938,7 @@
 </file>
 
 <file path=ppt/slides/slide7.xml><?xml version="1.0" encoding="utf-8"?>
-<p:sld xmlns:a="http://schemas.openxmlformats.org/drawingml/2006/main" xmlns:p="http://schemas.openxmlformats.org/presentationml/2006/main" xmlns:r="http://schemas.openxmlformats.org/officeDocument/2006/relationships">
+<p:sld xmlns:a="http://schemas.openxmlformats.org/drawingml/2006/main" xmlns:r="http://schemas.openxmlformats.org/officeDocument/2006/relationships" xmlns:p="http://schemas.openxmlformats.org/presentationml/2006/main">
   <p:cSld>
     <p:spTree>
       <p:nvGrpSpPr>
@@ -3854,7 +3946,14 @@
         <p:cNvGrpSpPr/>
         <p:nvPr/>
       </p:nvGrpSpPr>
-      <p:grpSpPr/>
+      <p:grpSpPr>
+        <a:xfrm>
+          <a:off x="0" y="0"/>
+          <a:ext cx="0" cy="0"/>
+          <a:chOff x="0" y="0"/>
+          <a:chExt cx="0" cy="0"/>
+        </a:xfrm>
+      </p:grpSpPr>
       <p:sp>
         <p:nvSpPr>
           <p:cNvPr id="2" name="Title 1"/>
@@ -3871,7 +3970,8 @@
           <a:lstStyle/>
           <a:p>
             <a:r>
-              <a:t>Chart - bivariate_children_vs_charges.png</a:t>
+              <a:rPr b="1"/>
+              <a:t>CHART: BIVARIATE CHILDREN VS CHARGES</a:t>
             </a:r>
           </a:p>
         </p:txBody>
@@ -3909,7 +4009,7 @@
 </file>
 
 <file path=ppt/slides/slide8.xml><?xml version="1.0" encoding="utf-8"?>
-<p:sld xmlns:a="http://schemas.openxmlformats.org/drawingml/2006/main" xmlns:p="http://schemas.openxmlformats.org/presentationml/2006/main" xmlns:r="http://schemas.openxmlformats.org/officeDocument/2006/relationships">
+<p:sld xmlns:a="http://schemas.openxmlformats.org/drawingml/2006/main" xmlns:r="http://schemas.openxmlformats.org/officeDocument/2006/relationships" xmlns:p="http://schemas.openxmlformats.org/presentationml/2006/main">
   <p:cSld>
     <p:spTree>
       <p:nvGrpSpPr>
@@ -3917,7 +4017,14 @@
         <p:cNvGrpSpPr/>
         <p:nvPr/>
       </p:nvGrpSpPr>
-      <p:grpSpPr/>
+      <p:grpSpPr>
+        <a:xfrm>
+          <a:off x="0" y="0"/>
+          <a:ext cx="0" cy="0"/>
+          <a:chOff x="0" y="0"/>
+          <a:chExt cx="0" cy="0"/>
+        </a:xfrm>
+      </p:grpSpPr>
       <p:sp>
         <p:nvSpPr>
           <p:cNvPr id="2" name="Title 1"/>
@@ -3934,7 +4041,8 @@
           <a:lstStyle/>
           <a:p>
             <a:r>
-              <a:t>Chart - correlation_matrix.png</a:t>
+              <a:rPr b="1"/>
+              <a:t>CHART: CORRELATION MATRIX</a:t>
             </a:r>
           </a:p>
         </p:txBody>
@@ -3972,7 +4080,7 @@
 </file>
 
 <file path=ppt/slides/slide9.xml><?xml version="1.0" encoding="utf-8"?>
-<p:sld xmlns:a="http://schemas.openxmlformats.org/drawingml/2006/main" xmlns:p="http://schemas.openxmlformats.org/presentationml/2006/main" xmlns:r="http://schemas.openxmlformats.org/officeDocument/2006/relationships">
+<p:sld xmlns:a="http://schemas.openxmlformats.org/drawingml/2006/main" xmlns:r="http://schemas.openxmlformats.org/officeDocument/2006/relationships" xmlns:p="http://schemas.openxmlformats.org/presentationml/2006/main">
   <p:cSld>
     <p:spTree>
       <p:nvGrpSpPr>
@@ -3980,7 +4088,14 @@
         <p:cNvGrpSpPr/>
         <p:nvPr/>
       </p:nvGrpSpPr>
-      <p:grpSpPr/>
+      <p:grpSpPr>
+        <a:xfrm>
+          <a:off x="0" y="0"/>
+          <a:ext cx="0" cy="0"/>
+          <a:chOff x="0" y="0"/>
+          <a:chExt cx="0" cy="0"/>
+        </a:xfrm>
+      </p:grpSpPr>
       <p:sp>
         <p:nvSpPr>
           <p:cNvPr id="2" name="Title 1"/>
@@ -3997,7 +4112,8 @@
           <a:lstStyle/>
           <a:p>
             <a:r>
-              <a:t>Chart - univariate_age.png</a:t>
+              <a:rPr b="1"/>
+              <a:t>CHART: UNIVARIATE AGE</a:t>
             </a:r>
           </a:p>
         </p:txBody>

</xml_diff>

<commit_message>
added optional functionality to give templates
</commit_message>
<xml_diff>
--- a/src/output/eda_presentation.pptx
+++ b/src/output/eda_presentation.pptx
@@ -5,23 +5,23 @@
     <p:sldMasterId id="2147483648" r:id="rId1"/>
   </p:sldMasterIdLst>
   <p:sldIdLst>
-    <p:sldId id="256" r:id="rId2"/>
-    <p:sldId id="257" r:id="rId3"/>
-    <p:sldId id="258" r:id="rId4"/>
-    <p:sldId id="259" r:id="rId5"/>
-    <p:sldId id="260" r:id="rId6"/>
-    <p:sldId id="261" r:id="rId7"/>
-    <p:sldId id="262" r:id="rId8"/>
-    <p:sldId id="263" r:id="rId9"/>
-    <p:sldId id="264" r:id="rId10"/>
-    <p:sldId id="265" r:id="rId11"/>
-    <p:sldId id="266" r:id="rId12"/>
-    <p:sldId id="267" r:id="rId13"/>
-    <p:sldId id="268" r:id="rId14"/>
-    <p:sldId id="269" r:id="rId15"/>
-    <p:sldId id="270" r:id="rId16"/>
+    <p:sldId id="256" r:id="rId7"/>
+    <p:sldId id="257" r:id="rId8"/>
+    <p:sldId id="258" r:id="rId9"/>
+    <p:sldId id="259" r:id="rId10"/>
+    <p:sldId id="260" r:id="rId11"/>
+    <p:sldId id="261" r:id="rId12"/>
+    <p:sldId id="262" r:id="rId13"/>
+    <p:sldId id="263" r:id="rId14"/>
+    <p:sldId id="264" r:id="rId15"/>
+    <p:sldId id="265" r:id="rId16"/>
+    <p:sldId id="266" r:id="rId17"/>
+    <p:sldId id="267" r:id="rId18"/>
+    <p:sldId id="268" r:id="rId19"/>
+    <p:sldId id="269" r:id="rId20"/>
+    <p:sldId id="270" r:id="rId21"/>
   </p:sldIdLst>
-  <p:sldSz cx="12192000" cy="6858000"/>
+  <p:sldSz cx="12191969" cy="6858000" type="screen4x3"/>
   <p:notesSz cx="6858000" cy="9144000"/>
   <p:defaultTextStyle>
     <a:defPPr>
@@ -118,22 +118,6 @@
       </a:defRPr>
     </a:lvl9pPr>
   </p:defaultTextStyle>
-  <p:extLst>
-    <p:ext uri="{EFAFB233-063F-42B5-8137-9DF3F51BA10A}">
-      <p15:sldGuideLst xmlns:p15="http://schemas.microsoft.com/office/powerpoint/2012/main">
-        <p15:guide id="1" orient="horz" pos="2160">
-          <p15:clr>
-            <a:srgbClr val="A4A3A4"/>
-          </p15:clr>
-        </p15:guide>
-        <p15:guide id="2" pos="2880">
-          <p15:clr>
-            <a:srgbClr val="A4A3A4"/>
-          </p15:clr>
-        </p15:guide>
-      </p15:sldGuideLst>
-    </p:ext>
-  </p:extLst>
 </p:presentation>
 </file>
 
@@ -175,9 +159,10 @@
           <a:lstStyle/>
           <a:p>
             <a:r>
-              <a:rPr lang="en-US"/>
+              <a:rPr lang="en-US" smtClean="0"/>
               <a:t>Click to edit Master title style</a:t>
             </a:r>
+            <a:endParaRPr lang="en-US"/>
           </a:p>
         </p:txBody>
       </p:sp>
@@ -293,9 +278,10 @@
           </a:lstStyle>
           <a:p>
             <a:r>
-              <a:rPr lang="en-US"/>
+              <a:rPr lang="en-US" smtClean="0"/>
               <a:t>Click to edit Master subtitle style</a:t>
             </a:r>
+            <a:endParaRPr lang="en-US"/>
           </a:p>
         </p:txBody>
       </p:sp>
@@ -316,7 +302,7 @@
           <a:p>
             <a:fld id="{5BCAD085-E8A6-8845-BD4E-CB4CCA059FC4}" type="datetimeFigureOut">
               <a:rPr lang="en-US" smtClean="0"/>
-              <a:t>10/5/2024</a:t>
+              <a:t>1/27/13</a:t>
             </a:fld>
             <a:endParaRPr lang="en-US"/>
           </a:p>
@@ -410,9 +396,10 @@
           <a:lstStyle/>
           <a:p>
             <a:r>
-              <a:rPr lang="en-US"/>
+              <a:rPr lang="en-US" smtClean="0"/>
               <a:t>Click to edit Master title style</a:t>
             </a:r>
+            <a:endParaRPr lang="en-US"/>
           </a:p>
         </p:txBody>
       </p:sp>
@@ -433,37 +420,38 @@
           <a:p>
             <a:pPr lvl="0"/>
             <a:r>
-              <a:rPr lang="en-US"/>
+              <a:rPr lang="en-US" smtClean="0"/>
               <a:t>Click to edit Master text styles</a:t>
             </a:r>
           </a:p>
           <a:p>
             <a:pPr lvl="1"/>
             <a:r>
-              <a:rPr lang="en-US"/>
+              <a:rPr lang="en-US" smtClean="0"/>
               <a:t>Second level</a:t>
             </a:r>
           </a:p>
           <a:p>
             <a:pPr lvl="2"/>
             <a:r>
-              <a:rPr lang="en-US"/>
+              <a:rPr lang="en-US" smtClean="0"/>
               <a:t>Third level</a:t>
             </a:r>
           </a:p>
           <a:p>
             <a:pPr lvl="3"/>
             <a:r>
-              <a:rPr lang="en-US"/>
+              <a:rPr lang="en-US" smtClean="0"/>
               <a:t>Fourth level</a:t>
             </a:r>
           </a:p>
           <a:p>
             <a:pPr lvl="4"/>
             <a:r>
-              <a:rPr lang="en-US"/>
+              <a:rPr lang="en-US" smtClean="0"/>
               <a:t>Fifth level</a:t>
             </a:r>
+            <a:endParaRPr lang="en-US"/>
           </a:p>
         </p:txBody>
       </p:sp>
@@ -484,7 +472,7 @@
           <a:p>
             <a:fld id="{5BCAD085-E8A6-8845-BD4E-CB4CCA059FC4}" type="datetimeFigureOut">
               <a:rPr lang="en-US" smtClean="0"/>
-              <a:t>10/5/2024</a:t>
+              <a:t>1/27/13</a:t>
             </a:fld>
             <a:endParaRPr lang="en-US"/>
           </a:p>
@@ -583,9 +571,10 @@
           <a:lstStyle/>
           <a:p>
             <a:r>
-              <a:rPr lang="en-US"/>
+              <a:rPr lang="en-US" smtClean="0"/>
               <a:t>Click to edit Master title style</a:t>
             </a:r>
+            <a:endParaRPr lang="en-US"/>
           </a:p>
         </p:txBody>
       </p:sp>
@@ -611,37 +600,38 @@
           <a:p>
             <a:pPr lvl="0"/>
             <a:r>
-              <a:rPr lang="en-US"/>
+              <a:rPr lang="en-US" smtClean="0"/>
               <a:t>Click to edit Master text styles</a:t>
             </a:r>
           </a:p>
           <a:p>
             <a:pPr lvl="1"/>
             <a:r>
-              <a:rPr lang="en-US"/>
+              <a:rPr lang="en-US" smtClean="0"/>
               <a:t>Second level</a:t>
             </a:r>
           </a:p>
           <a:p>
             <a:pPr lvl="2"/>
             <a:r>
-              <a:rPr lang="en-US"/>
+              <a:rPr lang="en-US" smtClean="0"/>
               <a:t>Third level</a:t>
             </a:r>
           </a:p>
           <a:p>
             <a:pPr lvl="3"/>
             <a:r>
-              <a:rPr lang="en-US"/>
+              <a:rPr lang="en-US" smtClean="0"/>
               <a:t>Fourth level</a:t>
             </a:r>
           </a:p>
           <a:p>
             <a:pPr lvl="4"/>
             <a:r>
-              <a:rPr lang="en-US"/>
+              <a:rPr lang="en-US" smtClean="0"/>
               <a:t>Fifth level</a:t>
             </a:r>
+            <a:endParaRPr lang="en-US"/>
           </a:p>
         </p:txBody>
       </p:sp>
@@ -662,7 +652,7 @@
           <a:p>
             <a:fld id="{5BCAD085-E8A6-8845-BD4E-CB4CCA059FC4}" type="datetimeFigureOut">
               <a:rPr lang="en-US" smtClean="0"/>
-              <a:t>10/5/2024</a:t>
+              <a:t>1/27/13</a:t>
             </a:fld>
             <a:endParaRPr lang="en-US"/>
           </a:p>
@@ -756,9 +746,10 @@
           <a:lstStyle/>
           <a:p>
             <a:r>
-              <a:rPr lang="en-US"/>
+              <a:rPr lang="en-US" smtClean="0"/>
               <a:t>Click to edit Master title style</a:t>
             </a:r>
+            <a:endParaRPr lang="en-US"/>
           </a:p>
         </p:txBody>
       </p:sp>
@@ -779,37 +770,38 @@
           <a:p>
             <a:pPr lvl="0"/>
             <a:r>
-              <a:rPr lang="en-US"/>
+              <a:rPr lang="en-US" smtClean="0"/>
               <a:t>Click to edit Master text styles</a:t>
             </a:r>
           </a:p>
           <a:p>
             <a:pPr lvl="1"/>
             <a:r>
-              <a:rPr lang="en-US"/>
+              <a:rPr lang="en-US" smtClean="0"/>
               <a:t>Second level</a:t>
             </a:r>
           </a:p>
           <a:p>
             <a:pPr lvl="2"/>
             <a:r>
-              <a:rPr lang="en-US"/>
+              <a:rPr lang="en-US" smtClean="0"/>
               <a:t>Third level</a:t>
             </a:r>
           </a:p>
           <a:p>
             <a:pPr lvl="3"/>
             <a:r>
-              <a:rPr lang="en-US"/>
+              <a:rPr lang="en-US" smtClean="0"/>
               <a:t>Fourth level</a:t>
             </a:r>
           </a:p>
           <a:p>
             <a:pPr lvl="4"/>
             <a:r>
-              <a:rPr lang="en-US"/>
+              <a:rPr lang="en-US" smtClean="0"/>
               <a:t>Fifth level</a:t>
             </a:r>
+            <a:endParaRPr lang="en-US"/>
           </a:p>
         </p:txBody>
       </p:sp>
@@ -830,7 +822,7 @@
           <a:p>
             <a:fld id="{5BCAD085-E8A6-8845-BD4E-CB4CCA059FC4}" type="datetimeFigureOut">
               <a:rPr lang="en-US" smtClean="0"/>
-              <a:t>10/5/2024</a:t>
+              <a:t>1/27/13</a:t>
             </a:fld>
             <a:endParaRPr lang="en-US"/>
           </a:p>
@@ -933,9 +925,10 @@
           </a:lstStyle>
           <a:p>
             <a:r>
-              <a:rPr lang="en-US"/>
+              <a:rPr lang="en-US" smtClean="0"/>
               <a:t>Click to edit Master title style</a:t>
             </a:r>
+            <a:endParaRPr lang="en-US"/>
           </a:p>
         </p:txBody>
       </p:sp>
@@ -1052,7 +1045,7 @@
           <a:p>
             <a:pPr lvl="0"/>
             <a:r>
-              <a:rPr lang="en-US"/>
+              <a:rPr lang="en-US" smtClean="0"/>
               <a:t>Click to edit Master text styles</a:t>
             </a:r>
           </a:p>
@@ -1075,7 +1068,7 @@
           <a:p>
             <a:fld id="{5BCAD085-E8A6-8845-BD4E-CB4CCA059FC4}" type="datetimeFigureOut">
               <a:rPr lang="en-US" smtClean="0"/>
-              <a:t>10/5/2024</a:t>
+              <a:t>1/27/13</a:t>
             </a:fld>
             <a:endParaRPr lang="en-US"/>
           </a:p>
@@ -1169,9 +1162,10 @@
           <a:lstStyle/>
           <a:p>
             <a:r>
-              <a:rPr lang="en-US"/>
+              <a:rPr lang="en-US" smtClean="0"/>
               <a:t>Click to edit Master title style</a:t>
             </a:r>
+            <a:endParaRPr lang="en-US"/>
           </a:p>
         </p:txBody>
       </p:sp>
@@ -1225,37 +1219,38 @@
           <a:p>
             <a:pPr lvl="0"/>
             <a:r>
-              <a:rPr lang="en-US"/>
+              <a:rPr lang="en-US" smtClean="0"/>
               <a:t>Click to edit Master text styles</a:t>
             </a:r>
           </a:p>
           <a:p>
             <a:pPr lvl="1"/>
             <a:r>
-              <a:rPr lang="en-US"/>
+              <a:rPr lang="en-US" smtClean="0"/>
               <a:t>Second level</a:t>
             </a:r>
           </a:p>
           <a:p>
             <a:pPr lvl="2"/>
             <a:r>
-              <a:rPr lang="en-US"/>
+              <a:rPr lang="en-US" smtClean="0"/>
               <a:t>Third level</a:t>
             </a:r>
           </a:p>
           <a:p>
             <a:pPr lvl="3"/>
             <a:r>
-              <a:rPr lang="en-US"/>
+              <a:rPr lang="en-US" smtClean="0"/>
               <a:t>Fourth level</a:t>
             </a:r>
           </a:p>
           <a:p>
             <a:pPr lvl="4"/>
             <a:r>
-              <a:rPr lang="en-US"/>
+              <a:rPr lang="en-US" smtClean="0"/>
               <a:t>Fifth level</a:t>
             </a:r>
+            <a:endParaRPr lang="en-US"/>
           </a:p>
         </p:txBody>
       </p:sp>
@@ -1309,37 +1304,38 @@
           <a:p>
             <a:pPr lvl="0"/>
             <a:r>
-              <a:rPr lang="en-US"/>
+              <a:rPr lang="en-US" smtClean="0"/>
               <a:t>Click to edit Master text styles</a:t>
             </a:r>
           </a:p>
           <a:p>
             <a:pPr lvl="1"/>
             <a:r>
-              <a:rPr lang="en-US"/>
+              <a:rPr lang="en-US" smtClean="0"/>
               <a:t>Second level</a:t>
             </a:r>
           </a:p>
           <a:p>
             <a:pPr lvl="2"/>
             <a:r>
-              <a:rPr lang="en-US"/>
+              <a:rPr lang="en-US" smtClean="0"/>
               <a:t>Third level</a:t>
             </a:r>
           </a:p>
           <a:p>
             <a:pPr lvl="3"/>
             <a:r>
-              <a:rPr lang="en-US"/>
+              <a:rPr lang="en-US" smtClean="0"/>
               <a:t>Fourth level</a:t>
             </a:r>
           </a:p>
           <a:p>
             <a:pPr lvl="4"/>
             <a:r>
-              <a:rPr lang="en-US"/>
+              <a:rPr lang="en-US" smtClean="0"/>
               <a:t>Fifth level</a:t>
             </a:r>
+            <a:endParaRPr lang="en-US"/>
           </a:p>
         </p:txBody>
       </p:sp>
@@ -1360,7 +1356,7 @@
           <a:p>
             <a:fld id="{5BCAD085-E8A6-8845-BD4E-CB4CCA059FC4}" type="datetimeFigureOut">
               <a:rPr lang="en-US" smtClean="0"/>
-              <a:t>10/5/2024</a:t>
+              <a:t>1/27/13</a:t>
             </a:fld>
             <a:endParaRPr lang="en-US"/>
           </a:p>
@@ -1458,9 +1454,10 @@
           </a:lstStyle>
           <a:p>
             <a:r>
-              <a:rPr lang="en-US"/>
+              <a:rPr lang="en-US" smtClean="0"/>
               <a:t>Click to edit Master title style</a:t>
             </a:r>
+            <a:endParaRPr lang="en-US"/>
           </a:p>
         </p:txBody>
       </p:sp>
@@ -1523,7 +1520,7 @@
           <a:p>
             <a:pPr lvl="0"/>
             <a:r>
-              <a:rPr lang="en-US"/>
+              <a:rPr lang="en-US" smtClean="0"/>
               <a:t>Click to edit Master text styles</a:t>
             </a:r>
           </a:p>
@@ -1579,37 +1576,38 @@
           <a:p>
             <a:pPr lvl="0"/>
             <a:r>
-              <a:rPr lang="en-US"/>
+              <a:rPr lang="en-US" smtClean="0"/>
               <a:t>Click to edit Master text styles</a:t>
             </a:r>
           </a:p>
           <a:p>
             <a:pPr lvl="1"/>
             <a:r>
-              <a:rPr lang="en-US"/>
+              <a:rPr lang="en-US" smtClean="0"/>
               <a:t>Second level</a:t>
             </a:r>
           </a:p>
           <a:p>
             <a:pPr lvl="2"/>
             <a:r>
-              <a:rPr lang="en-US"/>
+              <a:rPr lang="en-US" smtClean="0"/>
               <a:t>Third level</a:t>
             </a:r>
           </a:p>
           <a:p>
             <a:pPr lvl="3"/>
             <a:r>
-              <a:rPr lang="en-US"/>
+              <a:rPr lang="en-US" smtClean="0"/>
               <a:t>Fourth level</a:t>
             </a:r>
           </a:p>
           <a:p>
             <a:pPr lvl="4"/>
             <a:r>
-              <a:rPr lang="en-US"/>
+              <a:rPr lang="en-US" smtClean="0"/>
               <a:t>Fifth level</a:t>
             </a:r>
+            <a:endParaRPr lang="en-US"/>
           </a:p>
         </p:txBody>
       </p:sp>
@@ -1672,7 +1670,7 @@
           <a:p>
             <a:pPr lvl="0"/>
             <a:r>
-              <a:rPr lang="en-US"/>
+              <a:rPr lang="en-US" smtClean="0"/>
               <a:t>Click to edit Master text styles</a:t>
             </a:r>
           </a:p>
@@ -1728,37 +1726,38 @@
           <a:p>
             <a:pPr lvl="0"/>
             <a:r>
-              <a:rPr lang="en-US"/>
+              <a:rPr lang="en-US" smtClean="0"/>
               <a:t>Click to edit Master text styles</a:t>
             </a:r>
           </a:p>
           <a:p>
             <a:pPr lvl="1"/>
             <a:r>
-              <a:rPr lang="en-US"/>
+              <a:rPr lang="en-US" smtClean="0"/>
               <a:t>Second level</a:t>
             </a:r>
           </a:p>
           <a:p>
             <a:pPr lvl="2"/>
             <a:r>
-              <a:rPr lang="en-US"/>
+              <a:rPr lang="en-US" smtClean="0"/>
               <a:t>Third level</a:t>
             </a:r>
           </a:p>
           <a:p>
             <a:pPr lvl="3"/>
             <a:r>
-              <a:rPr lang="en-US"/>
+              <a:rPr lang="en-US" smtClean="0"/>
               <a:t>Fourth level</a:t>
             </a:r>
           </a:p>
           <a:p>
             <a:pPr lvl="4"/>
             <a:r>
-              <a:rPr lang="en-US"/>
+              <a:rPr lang="en-US" smtClean="0"/>
               <a:t>Fifth level</a:t>
             </a:r>
+            <a:endParaRPr lang="en-US"/>
           </a:p>
         </p:txBody>
       </p:sp>
@@ -1779,7 +1778,7 @@
           <a:p>
             <a:fld id="{5BCAD085-E8A6-8845-BD4E-CB4CCA059FC4}" type="datetimeFigureOut">
               <a:rPr lang="en-US" smtClean="0"/>
-              <a:t>10/5/2024</a:t>
+              <a:t>1/27/13</a:t>
             </a:fld>
             <a:endParaRPr lang="en-US"/>
           </a:p>
@@ -1873,9 +1872,10 @@
           <a:lstStyle/>
           <a:p>
             <a:r>
-              <a:rPr lang="en-US"/>
+              <a:rPr lang="en-US" smtClean="0"/>
               <a:t>Click to edit Master title style</a:t>
             </a:r>
+            <a:endParaRPr lang="en-US"/>
           </a:p>
         </p:txBody>
       </p:sp>
@@ -1896,7 +1896,7 @@
           <a:p>
             <a:fld id="{5BCAD085-E8A6-8845-BD4E-CB4CCA059FC4}" type="datetimeFigureOut">
               <a:rPr lang="en-US" smtClean="0"/>
-              <a:t>10/5/2024</a:t>
+              <a:t>1/27/13</a:t>
             </a:fld>
             <a:endParaRPr lang="en-US"/>
           </a:p>
@@ -1991,7 +1991,7 @@
           <a:p>
             <a:fld id="{5BCAD085-E8A6-8845-BD4E-CB4CCA059FC4}" type="datetimeFigureOut">
               <a:rPr lang="en-US" smtClean="0"/>
-              <a:t>10/5/2024</a:t>
+              <a:t>1/27/13</a:t>
             </a:fld>
             <a:endParaRPr lang="en-US"/>
           </a:p>
@@ -2094,9 +2094,10 @@
           </a:lstStyle>
           <a:p>
             <a:r>
-              <a:rPr lang="en-US"/>
+              <a:rPr lang="en-US" smtClean="0"/>
               <a:t>Click to edit Master title style</a:t>
             </a:r>
+            <a:endParaRPr lang="en-US"/>
           </a:p>
         </p:txBody>
       </p:sp>
@@ -2150,37 +2151,38 @@
           <a:p>
             <a:pPr lvl="0"/>
             <a:r>
-              <a:rPr lang="en-US"/>
+              <a:rPr lang="en-US" smtClean="0"/>
               <a:t>Click to edit Master text styles</a:t>
             </a:r>
           </a:p>
           <a:p>
             <a:pPr lvl="1"/>
             <a:r>
-              <a:rPr lang="en-US"/>
+              <a:rPr lang="en-US" smtClean="0"/>
               <a:t>Second level</a:t>
             </a:r>
           </a:p>
           <a:p>
             <a:pPr lvl="2"/>
             <a:r>
-              <a:rPr lang="en-US"/>
+              <a:rPr lang="en-US" smtClean="0"/>
               <a:t>Third level</a:t>
             </a:r>
           </a:p>
           <a:p>
             <a:pPr lvl="3"/>
             <a:r>
-              <a:rPr lang="en-US"/>
+              <a:rPr lang="en-US" smtClean="0"/>
               <a:t>Fourth level</a:t>
             </a:r>
           </a:p>
           <a:p>
             <a:pPr lvl="4"/>
             <a:r>
-              <a:rPr lang="en-US"/>
+              <a:rPr lang="en-US" smtClean="0"/>
               <a:t>Fifth level</a:t>
             </a:r>
+            <a:endParaRPr lang="en-US"/>
           </a:p>
         </p:txBody>
       </p:sp>
@@ -2243,7 +2245,7 @@
           <a:p>
             <a:pPr lvl="0"/>
             <a:r>
-              <a:rPr lang="en-US"/>
+              <a:rPr lang="en-US" smtClean="0"/>
               <a:t>Click to edit Master text styles</a:t>
             </a:r>
           </a:p>
@@ -2266,7 +2268,7 @@
           <a:p>
             <a:fld id="{5BCAD085-E8A6-8845-BD4E-CB4CCA059FC4}" type="datetimeFigureOut">
               <a:rPr lang="en-US" smtClean="0"/>
-              <a:t>10/5/2024</a:t>
+              <a:t>1/27/13</a:t>
             </a:fld>
             <a:endParaRPr lang="en-US"/>
           </a:p>
@@ -2369,9 +2371,10 @@
           </a:lstStyle>
           <a:p>
             <a:r>
-              <a:rPr lang="en-US"/>
+              <a:rPr lang="en-US" smtClean="0"/>
               <a:t>Click to edit Master title style</a:t>
             </a:r>
+            <a:endParaRPr lang="en-US"/>
           </a:p>
         </p:txBody>
       </p:sp>
@@ -2495,7 +2498,7 @@
           <a:p>
             <a:pPr lvl="0"/>
             <a:r>
-              <a:rPr lang="en-US"/>
+              <a:rPr lang="en-US" smtClean="0"/>
               <a:t>Click to edit Master text styles</a:t>
             </a:r>
           </a:p>
@@ -2518,7 +2521,7 @@
           <a:p>
             <a:fld id="{5BCAD085-E8A6-8845-BD4E-CB4CCA059FC4}" type="datetimeFigureOut">
               <a:rPr lang="en-US" smtClean="0"/>
-              <a:t>10/5/2024</a:t>
+              <a:t>1/27/13</a:t>
             </a:fld>
             <a:endParaRPr lang="en-US"/>
           </a:p>
@@ -2627,9 +2630,10 @@
           <a:lstStyle/>
           <a:p>
             <a:r>
-              <a:rPr lang="en-US"/>
+              <a:rPr lang="en-US" smtClean="0"/>
               <a:t>Click to edit Master title style</a:t>
             </a:r>
+            <a:endParaRPr lang="en-US"/>
           </a:p>
         </p:txBody>
       </p:sp>
@@ -2660,37 +2664,38 @@
           <a:p>
             <a:pPr lvl="0"/>
             <a:r>
-              <a:rPr lang="en-US"/>
+              <a:rPr lang="en-US" smtClean="0"/>
               <a:t>Click to edit Master text styles</a:t>
             </a:r>
           </a:p>
           <a:p>
             <a:pPr lvl="1"/>
             <a:r>
-              <a:rPr lang="en-US"/>
+              <a:rPr lang="en-US" smtClean="0"/>
               <a:t>Second level</a:t>
             </a:r>
           </a:p>
           <a:p>
             <a:pPr lvl="2"/>
             <a:r>
-              <a:rPr lang="en-US"/>
+              <a:rPr lang="en-US" smtClean="0"/>
               <a:t>Third level</a:t>
             </a:r>
           </a:p>
           <a:p>
             <a:pPr lvl="3"/>
             <a:r>
-              <a:rPr lang="en-US"/>
+              <a:rPr lang="en-US" smtClean="0"/>
               <a:t>Fourth level</a:t>
             </a:r>
           </a:p>
           <a:p>
             <a:pPr lvl="4"/>
             <a:r>
-              <a:rPr lang="en-US"/>
+              <a:rPr lang="en-US" smtClean="0"/>
               <a:t>Fifth level</a:t>
             </a:r>
+            <a:endParaRPr lang="en-US"/>
           </a:p>
         </p:txBody>
       </p:sp>
@@ -2729,7 +2734,7 @@
           <a:p>
             <a:fld id="{5BCAD085-E8A6-8845-BD4E-CB4CCA059FC4}" type="datetimeFigureOut">
               <a:rPr lang="en-US" smtClean="0"/>
-              <a:t>10/5/2024</a:t>
+              <a:t>1/27/13</a:t>
             </a:fld>
             <a:endParaRPr lang="en-US"/>
           </a:p>
@@ -3088,7 +3093,7 @@
 </file>
 
 <file path=ppt/slides/slide1.xml><?xml version="1.0" encoding="utf-8"?>
-<p:sld xmlns:a="http://schemas.openxmlformats.org/drawingml/2006/main" xmlns:r="http://schemas.openxmlformats.org/officeDocument/2006/relationships" xmlns:p="http://schemas.openxmlformats.org/presentationml/2006/main">
+<p:sld xmlns:a="http://schemas.openxmlformats.org/drawingml/2006/main" xmlns:p="http://schemas.openxmlformats.org/presentationml/2006/main" xmlns:r="http://schemas.openxmlformats.org/officeDocument/2006/relationships">
   <p:cSld>
     <p:spTree>
       <p:nvGrpSpPr>
@@ -3096,14 +3101,7 @@
         <p:cNvGrpSpPr/>
         <p:nvPr/>
       </p:nvGrpSpPr>
-      <p:grpSpPr>
-        <a:xfrm>
-          <a:off x="0" y="0"/>
-          <a:ext cx="0" cy="0"/>
-          <a:chOff x="0" y="0"/>
-          <a:chExt cx="0" cy="0"/>
-        </a:xfrm>
-      </p:grpSpPr>
+      <p:grpSpPr/>
       <p:sp>
         <p:nvSpPr>
           <p:cNvPr id="2" name="Title 1"/>
@@ -3157,7 +3155,7 @@
 </file>
 
 <file path=ppt/slides/slide10.xml><?xml version="1.0" encoding="utf-8"?>
-<p:sld xmlns:a="http://schemas.openxmlformats.org/drawingml/2006/main" xmlns:r="http://schemas.openxmlformats.org/officeDocument/2006/relationships" xmlns:p="http://schemas.openxmlformats.org/presentationml/2006/main">
+<p:sld xmlns:a="http://schemas.openxmlformats.org/drawingml/2006/main" xmlns:p="http://schemas.openxmlformats.org/presentationml/2006/main" xmlns:r="http://schemas.openxmlformats.org/officeDocument/2006/relationships">
   <p:cSld>
     <p:spTree>
       <p:nvGrpSpPr>
@@ -3165,14 +3163,7 @@
         <p:cNvGrpSpPr/>
         <p:nvPr/>
       </p:nvGrpSpPr>
-      <p:grpSpPr>
-        <a:xfrm>
-          <a:off x="0" y="0"/>
-          <a:ext cx="0" cy="0"/>
-          <a:chOff x="0" y="0"/>
-          <a:chExt cx="0" cy="0"/>
-        </a:xfrm>
-      </p:grpSpPr>
+      <p:grpSpPr/>
       <p:sp>
         <p:nvSpPr>
           <p:cNvPr id="2" name="Title 1"/>
@@ -3190,7 +3181,7 @@
           <a:p>
             <a:r>
               <a:rPr b="1"/>
-              <a:t>CHART: UNIVARIATE BMI</a:t>
+              <a:t>CHART - UNIVARIATE BMI</a:t>
             </a:r>
           </a:p>
         </p:txBody>
@@ -3228,7 +3219,7 @@
 </file>
 
 <file path=ppt/slides/slide11.xml><?xml version="1.0" encoding="utf-8"?>
-<p:sld xmlns:a="http://schemas.openxmlformats.org/drawingml/2006/main" xmlns:r="http://schemas.openxmlformats.org/officeDocument/2006/relationships" xmlns:p="http://schemas.openxmlformats.org/presentationml/2006/main">
+<p:sld xmlns:a="http://schemas.openxmlformats.org/drawingml/2006/main" xmlns:p="http://schemas.openxmlformats.org/presentationml/2006/main" xmlns:r="http://schemas.openxmlformats.org/officeDocument/2006/relationships">
   <p:cSld>
     <p:spTree>
       <p:nvGrpSpPr>
@@ -3236,14 +3227,7 @@
         <p:cNvGrpSpPr/>
         <p:nvPr/>
       </p:nvGrpSpPr>
-      <p:grpSpPr>
-        <a:xfrm>
-          <a:off x="0" y="0"/>
-          <a:ext cx="0" cy="0"/>
-          <a:chOff x="0" y="0"/>
-          <a:chExt cx="0" cy="0"/>
-        </a:xfrm>
-      </p:grpSpPr>
+      <p:grpSpPr/>
       <p:sp>
         <p:nvSpPr>
           <p:cNvPr id="2" name="Title 1"/>
@@ -3261,7 +3245,7 @@
           <a:p>
             <a:r>
               <a:rPr b="1"/>
-              <a:t>CHART: UNIVARIATE CHARGES</a:t>
+              <a:t>CHART - UNIVARIATE CHARGES</a:t>
             </a:r>
           </a:p>
         </p:txBody>
@@ -3299,7 +3283,7 @@
 </file>
 
 <file path=ppt/slides/slide12.xml><?xml version="1.0" encoding="utf-8"?>
-<p:sld xmlns:a="http://schemas.openxmlformats.org/drawingml/2006/main" xmlns:r="http://schemas.openxmlformats.org/officeDocument/2006/relationships" xmlns:p="http://schemas.openxmlformats.org/presentationml/2006/main">
+<p:sld xmlns:a="http://schemas.openxmlformats.org/drawingml/2006/main" xmlns:p="http://schemas.openxmlformats.org/presentationml/2006/main" xmlns:r="http://schemas.openxmlformats.org/officeDocument/2006/relationships">
   <p:cSld>
     <p:spTree>
       <p:nvGrpSpPr>
@@ -3307,14 +3291,7 @@
         <p:cNvGrpSpPr/>
         <p:nvPr/>
       </p:nvGrpSpPr>
-      <p:grpSpPr>
-        <a:xfrm>
-          <a:off x="0" y="0"/>
-          <a:ext cx="0" cy="0"/>
-          <a:chOff x="0" y="0"/>
-          <a:chExt cx="0" cy="0"/>
-        </a:xfrm>
-      </p:grpSpPr>
+      <p:grpSpPr/>
       <p:sp>
         <p:nvSpPr>
           <p:cNvPr id="2" name="Title 1"/>
@@ -3332,7 +3309,7 @@
           <a:p>
             <a:r>
               <a:rPr b="1"/>
-              <a:t>CHART: UNIVARIATE CHILDREN</a:t>
+              <a:t>CHART - UNIVARIATE CHILDREN</a:t>
             </a:r>
           </a:p>
         </p:txBody>
@@ -3370,7 +3347,7 @@
 </file>
 
 <file path=ppt/slides/slide13.xml><?xml version="1.0" encoding="utf-8"?>
-<p:sld xmlns:a="http://schemas.openxmlformats.org/drawingml/2006/main" xmlns:r="http://schemas.openxmlformats.org/officeDocument/2006/relationships" xmlns:p="http://schemas.openxmlformats.org/presentationml/2006/main">
+<p:sld xmlns:a="http://schemas.openxmlformats.org/drawingml/2006/main" xmlns:p="http://schemas.openxmlformats.org/presentationml/2006/main" xmlns:r="http://schemas.openxmlformats.org/officeDocument/2006/relationships">
   <p:cSld>
     <p:spTree>
       <p:nvGrpSpPr>
@@ -3378,14 +3355,7 @@
         <p:cNvGrpSpPr/>
         <p:nvPr/>
       </p:nvGrpSpPr>
-      <p:grpSpPr>
-        <a:xfrm>
-          <a:off x="0" y="0"/>
-          <a:ext cx="0" cy="0"/>
-          <a:chOff x="0" y="0"/>
-          <a:chExt cx="0" cy="0"/>
-        </a:xfrm>
-      </p:grpSpPr>
+      <p:grpSpPr/>
       <p:sp>
         <p:nvSpPr>
           <p:cNvPr id="2" name="Title 1"/>
@@ -3403,7 +3373,7 @@
           <a:p>
             <a:r>
               <a:rPr b="1"/>
-              <a:t>CHART: UNIVARIATE REGION</a:t>
+              <a:t>CHART - UNIVARIATE REGION</a:t>
             </a:r>
           </a:p>
         </p:txBody>
@@ -3441,7 +3411,7 @@
 </file>
 
 <file path=ppt/slides/slide14.xml><?xml version="1.0" encoding="utf-8"?>
-<p:sld xmlns:a="http://schemas.openxmlformats.org/drawingml/2006/main" xmlns:r="http://schemas.openxmlformats.org/officeDocument/2006/relationships" xmlns:p="http://schemas.openxmlformats.org/presentationml/2006/main">
+<p:sld xmlns:a="http://schemas.openxmlformats.org/drawingml/2006/main" xmlns:p="http://schemas.openxmlformats.org/presentationml/2006/main" xmlns:r="http://schemas.openxmlformats.org/officeDocument/2006/relationships">
   <p:cSld>
     <p:spTree>
       <p:nvGrpSpPr>
@@ -3449,14 +3419,7 @@
         <p:cNvGrpSpPr/>
         <p:nvPr/>
       </p:nvGrpSpPr>
-      <p:grpSpPr>
-        <a:xfrm>
-          <a:off x="0" y="0"/>
-          <a:ext cx="0" cy="0"/>
-          <a:chOff x="0" y="0"/>
-          <a:chExt cx="0" cy="0"/>
-        </a:xfrm>
-      </p:grpSpPr>
+      <p:grpSpPr/>
       <p:sp>
         <p:nvSpPr>
           <p:cNvPr id="2" name="Title 1"/>
@@ -3474,7 +3437,7 @@
           <a:p>
             <a:r>
               <a:rPr b="1"/>
-              <a:t>CHART: UNIVARIATE SEX</a:t>
+              <a:t>CHART - UNIVARIATE SEX</a:t>
             </a:r>
           </a:p>
         </p:txBody>
@@ -3512,7 +3475,7 @@
 </file>
 
 <file path=ppt/slides/slide15.xml><?xml version="1.0" encoding="utf-8"?>
-<p:sld xmlns:a="http://schemas.openxmlformats.org/drawingml/2006/main" xmlns:r="http://schemas.openxmlformats.org/officeDocument/2006/relationships" xmlns:p="http://schemas.openxmlformats.org/presentationml/2006/main">
+<p:sld xmlns:a="http://schemas.openxmlformats.org/drawingml/2006/main" xmlns:p="http://schemas.openxmlformats.org/presentationml/2006/main" xmlns:r="http://schemas.openxmlformats.org/officeDocument/2006/relationships">
   <p:cSld>
     <p:spTree>
       <p:nvGrpSpPr>
@@ -3520,14 +3483,7 @@
         <p:cNvGrpSpPr/>
         <p:nvPr/>
       </p:nvGrpSpPr>
-      <p:grpSpPr>
-        <a:xfrm>
-          <a:off x="0" y="0"/>
-          <a:ext cx="0" cy="0"/>
-          <a:chOff x="0" y="0"/>
-          <a:chExt cx="0" cy="0"/>
-        </a:xfrm>
-      </p:grpSpPr>
+      <p:grpSpPr/>
       <p:sp>
         <p:nvSpPr>
           <p:cNvPr id="2" name="Title 1"/>
@@ -3545,7 +3501,7 @@
           <a:p>
             <a:r>
               <a:rPr b="1"/>
-              <a:t>CHART: UNIVARIATE SMOKER</a:t>
+              <a:t>CHART - UNIVARIATE SMOKER</a:t>
             </a:r>
           </a:p>
         </p:txBody>
@@ -3583,7 +3539,7 @@
 </file>
 
 <file path=ppt/slides/slide2.xml><?xml version="1.0" encoding="utf-8"?>
-<p:sld xmlns:a="http://schemas.openxmlformats.org/drawingml/2006/main" xmlns:r="http://schemas.openxmlformats.org/officeDocument/2006/relationships" xmlns:p="http://schemas.openxmlformats.org/presentationml/2006/main">
+<p:sld xmlns:a="http://schemas.openxmlformats.org/drawingml/2006/main" xmlns:p="http://schemas.openxmlformats.org/presentationml/2006/main" xmlns:r="http://schemas.openxmlformats.org/officeDocument/2006/relationships">
   <p:cSld>
     <p:spTree>
       <p:nvGrpSpPr>
@@ -3591,14 +3547,7 @@
         <p:cNvGrpSpPr/>
         <p:nvPr/>
       </p:nvGrpSpPr>
-      <p:grpSpPr>
-        <a:xfrm>
-          <a:off x="0" y="0"/>
-          <a:ext cx="0" cy="0"/>
-          <a:chOff x="0" y="0"/>
-          <a:chExt cx="0" cy="0"/>
-        </a:xfrm>
-      </p:grpSpPr>
+      <p:grpSpPr/>
       <p:sp>
         <p:nvSpPr>
           <p:cNvPr id="2" name="Title 1"/>
@@ -3616,7 +3565,7 @@
           <a:p>
             <a:r>
               <a:rPr b="1"/>
-              <a:t>CHART: BIVARIATE AGE VS BMI</a:t>
+              <a:t>CHART - BIVARIATE AGE VS BMI</a:t>
             </a:r>
           </a:p>
         </p:txBody>
@@ -3654,7 +3603,7 @@
 </file>
 
 <file path=ppt/slides/slide3.xml><?xml version="1.0" encoding="utf-8"?>
-<p:sld xmlns:a="http://schemas.openxmlformats.org/drawingml/2006/main" xmlns:r="http://schemas.openxmlformats.org/officeDocument/2006/relationships" xmlns:p="http://schemas.openxmlformats.org/presentationml/2006/main">
+<p:sld xmlns:a="http://schemas.openxmlformats.org/drawingml/2006/main" xmlns:p="http://schemas.openxmlformats.org/presentationml/2006/main" xmlns:r="http://schemas.openxmlformats.org/officeDocument/2006/relationships">
   <p:cSld>
     <p:spTree>
       <p:nvGrpSpPr>
@@ -3662,14 +3611,7 @@
         <p:cNvGrpSpPr/>
         <p:nvPr/>
       </p:nvGrpSpPr>
-      <p:grpSpPr>
-        <a:xfrm>
-          <a:off x="0" y="0"/>
-          <a:ext cx="0" cy="0"/>
-          <a:chOff x="0" y="0"/>
-          <a:chExt cx="0" cy="0"/>
-        </a:xfrm>
-      </p:grpSpPr>
+      <p:grpSpPr/>
       <p:sp>
         <p:nvSpPr>
           <p:cNvPr id="2" name="Title 1"/>
@@ -3687,7 +3629,7 @@
           <a:p>
             <a:r>
               <a:rPr b="1"/>
-              <a:t>CHART: BIVARIATE AGE VS CHARGES</a:t>
+              <a:t>CHART - BIVARIATE AGE VS CHARGES</a:t>
             </a:r>
           </a:p>
         </p:txBody>
@@ -3725,7 +3667,7 @@
 </file>
 
 <file path=ppt/slides/slide4.xml><?xml version="1.0" encoding="utf-8"?>
-<p:sld xmlns:a="http://schemas.openxmlformats.org/drawingml/2006/main" xmlns:r="http://schemas.openxmlformats.org/officeDocument/2006/relationships" xmlns:p="http://schemas.openxmlformats.org/presentationml/2006/main">
+<p:sld xmlns:a="http://schemas.openxmlformats.org/drawingml/2006/main" xmlns:p="http://schemas.openxmlformats.org/presentationml/2006/main" xmlns:r="http://schemas.openxmlformats.org/officeDocument/2006/relationships">
   <p:cSld>
     <p:spTree>
       <p:nvGrpSpPr>
@@ -3733,14 +3675,7 @@
         <p:cNvGrpSpPr/>
         <p:nvPr/>
       </p:nvGrpSpPr>
-      <p:grpSpPr>
-        <a:xfrm>
-          <a:off x="0" y="0"/>
-          <a:ext cx="0" cy="0"/>
-          <a:chOff x="0" y="0"/>
-          <a:chExt cx="0" cy="0"/>
-        </a:xfrm>
-      </p:grpSpPr>
+      <p:grpSpPr/>
       <p:sp>
         <p:nvSpPr>
           <p:cNvPr id="2" name="Title 1"/>
@@ -3758,7 +3693,7 @@
           <a:p>
             <a:r>
               <a:rPr b="1"/>
-              <a:t>CHART: BIVARIATE AGE VS CHILDREN</a:t>
+              <a:t>CHART - BIVARIATE AGE VS CHILDREN</a:t>
             </a:r>
           </a:p>
         </p:txBody>
@@ -3796,7 +3731,7 @@
 </file>
 
 <file path=ppt/slides/slide5.xml><?xml version="1.0" encoding="utf-8"?>
-<p:sld xmlns:a="http://schemas.openxmlformats.org/drawingml/2006/main" xmlns:r="http://schemas.openxmlformats.org/officeDocument/2006/relationships" xmlns:p="http://schemas.openxmlformats.org/presentationml/2006/main">
+<p:sld xmlns:a="http://schemas.openxmlformats.org/drawingml/2006/main" xmlns:p="http://schemas.openxmlformats.org/presentationml/2006/main" xmlns:r="http://schemas.openxmlformats.org/officeDocument/2006/relationships">
   <p:cSld>
     <p:spTree>
       <p:nvGrpSpPr>
@@ -3804,14 +3739,7 @@
         <p:cNvGrpSpPr/>
         <p:nvPr/>
       </p:nvGrpSpPr>
-      <p:grpSpPr>
-        <a:xfrm>
-          <a:off x="0" y="0"/>
-          <a:ext cx="0" cy="0"/>
-          <a:chOff x="0" y="0"/>
-          <a:chExt cx="0" cy="0"/>
-        </a:xfrm>
-      </p:grpSpPr>
+      <p:grpSpPr/>
       <p:sp>
         <p:nvSpPr>
           <p:cNvPr id="2" name="Title 1"/>
@@ -3829,7 +3757,7 @@
           <a:p>
             <a:r>
               <a:rPr b="1"/>
-              <a:t>CHART: BIVARIATE BMI VS CHARGES</a:t>
+              <a:t>CHART - BIVARIATE BMI VS CHARGES</a:t>
             </a:r>
           </a:p>
         </p:txBody>
@@ -3867,7 +3795,7 @@
 </file>
 
 <file path=ppt/slides/slide6.xml><?xml version="1.0" encoding="utf-8"?>
-<p:sld xmlns:a="http://schemas.openxmlformats.org/drawingml/2006/main" xmlns:r="http://schemas.openxmlformats.org/officeDocument/2006/relationships" xmlns:p="http://schemas.openxmlformats.org/presentationml/2006/main">
+<p:sld xmlns:a="http://schemas.openxmlformats.org/drawingml/2006/main" xmlns:p="http://schemas.openxmlformats.org/presentationml/2006/main" xmlns:r="http://schemas.openxmlformats.org/officeDocument/2006/relationships">
   <p:cSld>
     <p:spTree>
       <p:nvGrpSpPr>
@@ -3875,14 +3803,7 @@
         <p:cNvGrpSpPr/>
         <p:nvPr/>
       </p:nvGrpSpPr>
-      <p:grpSpPr>
-        <a:xfrm>
-          <a:off x="0" y="0"/>
-          <a:ext cx="0" cy="0"/>
-          <a:chOff x="0" y="0"/>
-          <a:chExt cx="0" cy="0"/>
-        </a:xfrm>
-      </p:grpSpPr>
+      <p:grpSpPr/>
       <p:sp>
         <p:nvSpPr>
           <p:cNvPr id="2" name="Title 1"/>
@@ -3900,7 +3821,7 @@
           <a:p>
             <a:r>
               <a:rPr b="1"/>
-              <a:t>CHART: BIVARIATE BMI VS CHILDREN</a:t>
+              <a:t>CHART - BIVARIATE BMI VS CHILDREN</a:t>
             </a:r>
           </a:p>
         </p:txBody>
@@ -3938,7 +3859,7 @@
 </file>
 
 <file path=ppt/slides/slide7.xml><?xml version="1.0" encoding="utf-8"?>
-<p:sld xmlns:a="http://schemas.openxmlformats.org/drawingml/2006/main" xmlns:r="http://schemas.openxmlformats.org/officeDocument/2006/relationships" xmlns:p="http://schemas.openxmlformats.org/presentationml/2006/main">
+<p:sld xmlns:a="http://schemas.openxmlformats.org/drawingml/2006/main" xmlns:p="http://schemas.openxmlformats.org/presentationml/2006/main" xmlns:r="http://schemas.openxmlformats.org/officeDocument/2006/relationships">
   <p:cSld>
     <p:spTree>
       <p:nvGrpSpPr>
@@ -3946,14 +3867,7 @@
         <p:cNvGrpSpPr/>
         <p:nvPr/>
       </p:nvGrpSpPr>
-      <p:grpSpPr>
-        <a:xfrm>
-          <a:off x="0" y="0"/>
-          <a:ext cx="0" cy="0"/>
-          <a:chOff x="0" y="0"/>
-          <a:chExt cx="0" cy="0"/>
-        </a:xfrm>
-      </p:grpSpPr>
+      <p:grpSpPr/>
       <p:sp>
         <p:nvSpPr>
           <p:cNvPr id="2" name="Title 1"/>
@@ -3971,7 +3885,7 @@
           <a:p>
             <a:r>
               <a:rPr b="1"/>
-              <a:t>CHART: BIVARIATE CHILDREN VS CHARGES</a:t>
+              <a:t>CHART - BIVARIATE CHILDREN VS CHARGES</a:t>
             </a:r>
           </a:p>
         </p:txBody>
@@ -4009,7 +3923,7 @@
 </file>
 
 <file path=ppt/slides/slide8.xml><?xml version="1.0" encoding="utf-8"?>
-<p:sld xmlns:a="http://schemas.openxmlformats.org/drawingml/2006/main" xmlns:r="http://schemas.openxmlformats.org/officeDocument/2006/relationships" xmlns:p="http://schemas.openxmlformats.org/presentationml/2006/main">
+<p:sld xmlns:a="http://schemas.openxmlformats.org/drawingml/2006/main" xmlns:p="http://schemas.openxmlformats.org/presentationml/2006/main" xmlns:r="http://schemas.openxmlformats.org/officeDocument/2006/relationships">
   <p:cSld>
     <p:spTree>
       <p:nvGrpSpPr>
@@ -4017,14 +3931,7 @@
         <p:cNvGrpSpPr/>
         <p:nvPr/>
       </p:nvGrpSpPr>
-      <p:grpSpPr>
-        <a:xfrm>
-          <a:off x="0" y="0"/>
-          <a:ext cx="0" cy="0"/>
-          <a:chOff x="0" y="0"/>
-          <a:chExt cx="0" cy="0"/>
-        </a:xfrm>
-      </p:grpSpPr>
+      <p:grpSpPr/>
       <p:sp>
         <p:nvSpPr>
           <p:cNvPr id="2" name="Title 1"/>
@@ -4042,7 +3949,7 @@
           <a:p>
             <a:r>
               <a:rPr b="1"/>
-              <a:t>CHART: CORRELATION MATRIX</a:t>
+              <a:t>CHART - CORRELATION MATRIX</a:t>
             </a:r>
           </a:p>
         </p:txBody>
@@ -4080,7 +3987,7 @@
 </file>
 
 <file path=ppt/slides/slide9.xml><?xml version="1.0" encoding="utf-8"?>
-<p:sld xmlns:a="http://schemas.openxmlformats.org/drawingml/2006/main" xmlns:r="http://schemas.openxmlformats.org/officeDocument/2006/relationships" xmlns:p="http://schemas.openxmlformats.org/presentationml/2006/main">
+<p:sld xmlns:a="http://schemas.openxmlformats.org/drawingml/2006/main" xmlns:p="http://schemas.openxmlformats.org/presentationml/2006/main" xmlns:r="http://schemas.openxmlformats.org/officeDocument/2006/relationships">
   <p:cSld>
     <p:spTree>
       <p:nvGrpSpPr>
@@ -4088,14 +3995,7 @@
         <p:cNvGrpSpPr/>
         <p:nvPr/>
       </p:nvGrpSpPr>
-      <p:grpSpPr>
-        <a:xfrm>
-          <a:off x="0" y="0"/>
-          <a:ext cx="0" cy="0"/>
-          <a:chOff x="0" y="0"/>
-          <a:chExt cx="0" cy="0"/>
-        </a:xfrm>
-      </p:grpSpPr>
+      <p:grpSpPr/>
       <p:sp>
         <p:nvSpPr>
           <p:cNvPr id="2" name="Title 1"/>
@@ -4113,7 +4013,7 @@
           <a:p>
             <a:r>
               <a:rPr b="1"/>
-              <a:t>CHART: UNIVARIATE AGE</a:t>
+              <a:t>CHART - UNIVARIATE AGE</a:t>
             </a:r>
           </a:p>
         </p:txBody>

</xml_diff>